<commit_message>
Ch01: Corrections done, needs proofread and find a reformulation in section Cr fine structure.
</commit_message>
<xml_diff>
--- a/01-QD/Pictures/MnCrystal.pptx
+++ b/01-QD/Pictures/MnCrystal.pptx
@@ -7,7 +7,7 @@
   <p:sldIdLst>
     <p:sldId id="256" r:id="rId2"/>
   </p:sldIdLst>
-  <p:sldSz cx="4140200" cy="3421063"/>
+  <p:sldSz cx="4140200" cy="4789488"/>
   <p:notesSz cx="6858000" cy="9144000"/>
   <p:defaultTextStyle>
     <a:defPPr>
@@ -136,8 +136,8 @@
         </p:nvSpPr>
         <p:spPr>
           <a:xfrm>
-            <a:off x="310516" y="1062748"/>
-            <a:ext cx="3519170" cy="733311"/>
+            <a:off x="310516" y="1487849"/>
+            <a:ext cx="3519170" cy="1026634"/>
           </a:xfrm>
         </p:spPr>
         <p:txBody>
@@ -164,8 +164,8 @@
         </p:nvSpPr>
         <p:spPr>
           <a:xfrm>
-            <a:off x="621030" y="1938604"/>
-            <a:ext cx="2898140" cy="874271"/>
+            <a:off x="621030" y="2714047"/>
+            <a:ext cx="2898140" cy="1223979"/>
           </a:xfrm>
         </p:spPr>
         <p:txBody>
@@ -288,7 +288,7 @@
           <a:p>
             <a:fld id="{5D25FA07-FE11-48AD-AB24-E261AC47F041}" type="datetimeFigureOut">
               <a:rPr lang="fr-FR" smtClean="0"/>
-              <a:t>29/06/2017</a:t>
+              <a:t>17/07/2017</a:t>
             </a:fld>
             <a:endParaRPr lang="fr-FR"/>
           </a:p>
@@ -458,7 +458,7 @@
           <a:p>
             <a:fld id="{5D25FA07-FE11-48AD-AB24-E261AC47F041}" type="datetimeFigureOut">
               <a:rPr lang="fr-FR" smtClean="0"/>
-              <a:t>29/06/2017</a:t>
+              <a:t>17/07/2017</a:t>
             </a:fld>
             <a:endParaRPr lang="fr-FR"/>
           </a:p>
@@ -548,8 +548,8 @@
         </p:nvSpPr>
         <p:spPr>
           <a:xfrm>
-            <a:off x="3001645" y="137002"/>
-            <a:ext cx="931546" cy="2918990"/>
+            <a:off x="3001645" y="191804"/>
+            <a:ext cx="931546" cy="4086585"/>
           </a:xfrm>
         </p:spPr>
         <p:txBody>
@@ -576,8 +576,8 @@
         </p:nvSpPr>
         <p:spPr>
           <a:xfrm>
-            <a:off x="207013" y="137002"/>
-            <a:ext cx="2725631" cy="2918990"/>
+            <a:off x="207017" y="191804"/>
+            <a:ext cx="2725631" cy="4086585"/>
           </a:xfrm>
         </p:spPr>
         <p:txBody>
@@ -638,7 +638,7 @@
           <a:p>
             <a:fld id="{5D25FA07-FE11-48AD-AB24-E261AC47F041}" type="datetimeFigureOut">
               <a:rPr lang="fr-FR" smtClean="0"/>
-              <a:t>29/06/2017</a:t>
+              <a:t>17/07/2017</a:t>
             </a:fld>
             <a:endParaRPr lang="fr-FR"/>
           </a:p>
@@ -808,7 +808,7 @@
           <a:p>
             <a:fld id="{5D25FA07-FE11-48AD-AB24-E261AC47F041}" type="datetimeFigureOut">
               <a:rPr lang="fr-FR" smtClean="0"/>
-              <a:t>29/06/2017</a:t>
+              <a:t>17/07/2017</a:t>
             </a:fld>
             <a:endParaRPr lang="fr-FR"/>
           </a:p>
@@ -898,8 +898,8 @@
         </p:nvSpPr>
         <p:spPr>
           <a:xfrm>
-            <a:off x="327048" y="2198352"/>
-            <a:ext cx="3519170" cy="679461"/>
+            <a:off x="327048" y="3077693"/>
+            <a:ext cx="3519170" cy="951246"/>
           </a:xfrm>
         </p:spPr>
         <p:txBody>
@@ -930,8 +930,8 @@
         </p:nvSpPr>
         <p:spPr>
           <a:xfrm>
-            <a:off x="327048" y="1449994"/>
-            <a:ext cx="3519170" cy="748357"/>
+            <a:off x="327048" y="2029993"/>
+            <a:ext cx="3519170" cy="1047699"/>
           </a:xfrm>
         </p:spPr>
         <p:txBody>
@@ -1054,7 +1054,7 @@
           <a:p>
             <a:fld id="{5D25FA07-FE11-48AD-AB24-E261AC47F041}" type="datetimeFigureOut">
               <a:rPr lang="fr-FR" smtClean="0"/>
-              <a:t>29/06/2017</a:t>
+              <a:t>17/07/2017</a:t>
             </a:fld>
             <a:endParaRPr lang="fr-FR"/>
           </a:p>
@@ -1167,8 +1167,8 @@
         </p:nvSpPr>
         <p:spPr>
           <a:xfrm>
-            <a:off x="207011" y="798249"/>
-            <a:ext cx="1828588" cy="2257744"/>
+            <a:off x="207011" y="1117550"/>
+            <a:ext cx="1828588" cy="3160842"/>
           </a:xfrm>
         </p:spPr>
         <p:txBody>
@@ -1252,8 +1252,8 @@
         </p:nvSpPr>
         <p:spPr>
           <a:xfrm>
-            <a:off x="2104603" y="798249"/>
-            <a:ext cx="1828588" cy="2257744"/>
+            <a:off x="2104603" y="1117550"/>
+            <a:ext cx="1828588" cy="3160842"/>
           </a:xfrm>
         </p:spPr>
         <p:txBody>
@@ -1342,7 +1342,7 @@
           <a:p>
             <a:fld id="{5D25FA07-FE11-48AD-AB24-E261AC47F041}" type="datetimeFigureOut">
               <a:rPr lang="fr-FR" smtClean="0"/>
-              <a:t>29/06/2017</a:t>
+              <a:t>17/07/2017</a:t>
             </a:fld>
             <a:endParaRPr lang="fr-FR"/>
           </a:p>
@@ -1459,8 +1459,8 @@
         </p:nvSpPr>
         <p:spPr>
           <a:xfrm>
-            <a:off x="207012" y="765781"/>
-            <a:ext cx="1829307" cy="319141"/>
+            <a:off x="207016" y="1072094"/>
+            <a:ext cx="1829307" cy="446798"/>
           </a:xfrm>
         </p:spPr>
         <p:txBody>
@@ -1524,8 +1524,8 @@
         </p:nvSpPr>
         <p:spPr>
           <a:xfrm>
-            <a:off x="207012" y="1084921"/>
-            <a:ext cx="1829307" cy="1971072"/>
+            <a:off x="207016" y="1518890"/>
+            <a:ext cx="1829307" cy="2759501"/>
           </a:xfrm>
         </p:spPr>
         <p:txBody>
@@ -1609,8 +1609,8 @@
         </p:nvSpPr>
         <p:spPr>
           <a:xfrm>
-            <a:off x="2103164" y="765781"/>
-            <a:ext cx="1830027" cy="319141"/>
+            <a:off x="2103168" y="1072094"/>
+            <a:ext cx="1830027" cy="446798"/>
           </a:xfrm>
         </p:spPr>
         <p:txBody>
@@ -1674,8 +1674,8 @@
         </p:nvSpPr>
         <p:spPr>
           <a:xfrm>
-            <a:off x="2103164" y="1084921"/>
-            <a:ext cx="1830027" cy="1971072"/>
+            <a:off x="2103168" y="1518890"/>
+            <a:ext cx="1830027" cy="2759501"/>
           </a:xfrm>
         </p:spPr>
         <p:txBody>
@@ -1764,7 +1764,7 @@
           <a:p>
             <a:fld id="{5D25FA07-FE11-48AD-AB24-E261AC47F041}" type="datetimeFigureOut">
               <a:rPr lang="fr-FR" smtClean="0"/>
-              <a:t>29/06/2017</a:t>
+              <a:t>17/07/2017</a:t>
             </a:fld>
             <a:endParaRPr lang="fr-FR"/>
           </a:p>
@@ -1882,7 +1882,7 @@
           <a:p>
             <a:fld id="{5D25FA07-FE11-48AD-AB24-E261AC47F041}" type="datetimeFigureOut">
               <a:rPr lang="fr-FR" smtClean="0"/>
-              <a:t>29/06/2017</a:t>
+              <a:t>17/07/2017</a:t>
             </a:fld>
             <a:endParaRPr lang="fr-FR"/>
           </a:p>
@@ -1977,7 +1977,7 @@
           <a:p>
             <a:fld id="{5D25FA07-FE11-48AD-AB24-E261AC47F041}" type="datetimeFigureOut">
               <a:rPr lang="fr-FR" smtClean="0"/>
-              <a:t>29/06/2017</a:t>
+              <a:t>17/07/2017</a:t>
             </a:fld>
             <a:endParaRPr lang="fr-FR"/>
           </a:p>
@@ -2067,8 +2067,8 @@
         </p:nvSpPr>
         <p:spPr>
           <a:xfrm>
-            <a:off x="207011" y="136209"/>
-            <a:ext cx="1362097" cy="579680"/>
+            <a:off x="207015" y="190694"/>
+            <a:ext cx="1362097" cy="811551"/>
           </a:xfrm>
         </p:spPr>
         <p:txBody>
@@ -2099,8 +2099,8 @@
         </p:nvSpPr>
         <p:spPr>
           <a:xfrm>
-            <a:off x="1618705" y="136210"/>
-            <a:ext cx="2314487" cy="2919782"/>
+            <a:off x="1618709" y="190693"/>
+            <a:ext cx="2314487" cy="4087695"/>
           </a:xfrm>
         </p:spPr>
         <p:txBody>
@@ -2184,8 +2184,8 @@
         </p:nvSpPr>
         <p:spPr>
           <a:xfrm>
-            <a:off x="207011" y="715890"/>
-            <a:ext cx="1362097" cy="2340102"/>
+            <a:off x="207015" y="1002246"/>
+            <a:ext cx="1362097" cy="3276143"/>
           </a:xfrm>
         </p:spPr>
         <p:txBody>
@@ -2254,7 +2254,7 @@
           <a:p>
             <a:fld id="{5D25FA07-FE11-48AD-AB24-E261AC47F041}" type="datetimeFigureOut">
               <a:rPr lang="fr-FR" smtClean="0"/>
-              <a:t>29/06/2017</a:t>
+              <a:t>17/07/2017</a:t>
             </a:fld>
             <a:endParaRPr lang="fr-FR"/>
           </a:p>
@@ -2344,8 +2344,8 @@
         </p:nvSpPr>
         <p:spPr>
           <a:xfrm>
-            <a:off x="811508" y="2394746"/>
-            <a:ext cx="2484120" cy="282713"/>
+            <a:off x="811508" y="3352644"/>
+            <a:ext cx="2484120" cy="395799"/>
           </a:xfrm>
         </p:spPr>
         <p:txBody>
@@ -2376,8 +2376,8 @@
         </p:nvSpPr>
         <p:spPr>
           <a:xfrm>
-            <a:off x="811508" y="305679"/>
-            <a:ext cx="2484120" cy="2052638"/>
+            <a:off x="811508" y="427952"/>
+            <a:ext cx="2484120" cy="2873693"/>
           </a:xfrm>
         </p:spPr>
         <p:txBody>
@@ -2437,8 +2437,8 @@
         </p:nvSpPr>
         <p:spPr>
           <a:xfrm>
-            <a:off x="811508" y="2677458"/>
-            <a:ext cx="2484120" cy="401499"/>
+            <a:off x="811508" y="3748443"/>
+            <a:ext cx="2484120" cy="562098"/>
           </a:xfrm>
         </p:spPr>
         <p:txBody>
@@ -2507,7 +2507,7 @@
           <a:p>
             <a:fld id="{5D25FA07-FE11-48AD-AB24-E261AC47F041}" type="datetimeFigureOut">
               <a:rPr lang="fr-FR" smtClean="0"/>
-              <a:t>29/06/2017</a:t>
+              <a:t>17/07/2017</a:t>
             </a:fld>
             <a:endParaRPr lang="fr-FR"/>
           </a:p>
@@ -2602,8 +2602,8 @@
         </p:nvSpPr>
         <p:spPr>
           <a:xfrm>
-            <a:off x="207010" y="137002"/>
-            <a:ext cx="3726180" cy="570178"/>
+            <a:off x="207010" y="191803"/>
+            <a:ext cx="3726180" cy="798250"/>
           </a:xfrm>
           <a:prstGeom prst="rect">
             <a:avLst/>
@@ -2635,8 +2635,8 @@
         </p:nvSpPr>
         <p:spPr>
           <a:xfrm>
-            <a:off x="207010" y="798249"/>
-            <a:ext cx="3726180" cy="2257744"/>
+            <a:off x="207010" y="1117550"/>
+            <a:ext cx="3726180" cy="3160842"/>
           </a:xfrm>
           <a:prstGeom prst="rect">
             <a:avLst/>
@@ -2697,8 +2697,8 @@
         </p:nvSpPr>
         <p:spPr>
           <a:xfrm>
-            <a:off x="207012" y="3170820"/>
-            <a:ext cx="966047" cy="182139"/>
+            <a:off x="207016" y="4439149"/>
+            <a:ext cx="966047" cy="254994"/>
           </a:xfrm>
           <a:prstGeom prst="rect">
             <a:avLst/>
@@ -2720,7 +2720,7 @@
           <a:p>
             <a:fld id="{5D25FA07-FE11-48AD-AB24-E261AC47F041}" type="datetimeFigureOut">
               <a:rPr lang="fr-FR" smtClean="0"/>
-              <a:t>29/06/2017</a:t>
+              <a:t>17/07/2017</a:t>
             </a:fld>
             <a:endParaRPr lang="fr-FR"/>
           </a:p>
@@ -2738,8 +2738,8 @@
         </p:nvSpPr>
         <p:spPr>
           <a:xfrm>
-            <a:off x="1414570" y="3170820"/>
-            <a:ext cx="1311063" cy="182139"/>
+            <a:off x="1414574" y="4439149"/>
+            <a:ext cx="1311063" cy="254994"/>
           </a:xfrm>
           <a:prstGeom prst="rect">
             <a:avLst/>
@@ -2775,8 +2775,8 @@
         </p:nvSpPr>
         <p:spPr>
           <a:xfrm>
-            <a:off x="2967145" y="3170820"/>
-            <a:ext cx="966047" cy="182139"/>
+            <a:off x="2967149" y="4439149"/>
+            <a:ext cx="966047" cy="254994"/>
           </a:xfrm>
           <a:prstGeom prst="rect">
             <a:avLst/>
@@ -3097,13 +3097,13 @@
       </p:grpSpPr>
       <p:cxnSp>
         <p:nvCxnSpPr>
-          <p:cNvPr id="132" name="Connecteur droit 131"/>
+          <p:cNvPr id="252" name="Connecteur droit 251"/>
           <p:cNvCxnSpPr/>
           <p:nvPr/>
         </p:nvCxnSpPr>
         <p:spPr>
           <a:xfrm>
-            <a:off x="190052" y="2970000"/>
+            <a:off x="190052" y="4256092"/>
             <a:ext cx="360040" cy="0"/>
           </a:xfrm>
           <a:prstGeom prst="line">
@@ -3128,13 +3128,13 @@
       </p:cxnSp>
       <p:cxnSp>
         <p:nvCxnSpPr>
-          <p:cNvPr id="133" name="Connecteur droit 132"/>
+          <p:cNvPr id="253" name="Connecteur droit 252"/>
           <p:cNvCxnSpPr/>
           <p:nvPr/>
         </p:nvCxnSpPr>
         <p:spPr>
           <a:xfrm>
-            <a:off x="1270172" y="2970336"/>
+            <a:off x="1270172" y="4256428"/>
             <a:ext cx="360040" cy="0"/>
           </a:xfrm>
           <a:prstGeom prst="line">
@@ -3159,13 +3159,13 @@
       </p:cxnSp>
       <p:cxnSp>
         <p:nvCxnSpPr>
-          <p:cNvPr id="149" name="Connecteur droit 148"/>
+          <p:cNvPr id="254" name="Connecteur droit 253"/>
           <p:cNvCxnSpPr/>
           <p:nvPr/>
         </p:nvCxnSpPr>
         <p:spPr>
           <a:xfrm>
-            <a:off x="1642813" y="2970336"/>
+            <a:off x="1642813" y="4256428"/>
             <a:ext cx="792088" cy="0"/>
           </a:xfrm>
           <a:prstGeom prst="line">
@@ -3192,13 +3192,13 @@
       </p:cxnSp>
       <p:cxnSp>
         <p:nvCxnSpPr>
-          <p:cNvPr id="172" name="Connecteur droit 171"/>
+          <p:cNvPr id="255" name="Connecteur droit 254"/>
           <p:cNvCxnSpPr/>
           <p:nvPr/>
         </p:nvCxnSpPr>
         <p:spPr>
           <a:xfrm>
-            <a:off x="2425862" y="2970000"/>
+            <a:off x="2425862" y="4256092"/>
             <a:ext cx="360040" cy="0"/>
           </a:xfrm>
           <a:prstGeom prst="line">
@@ -3223,13 +3223,13 @@
       </p:cxnSp>
       <p:cxnSp>
         <p:nvCxnSpPr>
-          <p:cNvPr id="173" name="Connecteur droit 172"/>
+          <p:cNvPr id="256" name="Connecteur droit 255"/>
           <p:cNvCxnSpPr/>
           <p:nvPr/>
         </p:nvCxnSpPr>
         <p:spPr>
           <a:xfrm>
-            <a:off x="3502420" y="2970000"/>
+            <a:off x="3502420" y="4256092"/>
             <a:ext cx="360040" cy="0"/>
           </a:xfrm>
           <a:prstGeom prst="line">
@@ -3254,13 +3254,13 @@
       </p:cxnSp>
       <p:cxnSp>
         <p:nvCxnSpPr>
-          <p:cNvPr id="174" name="Connecteur droit 173"/>
+          <p:cNvPr id="257" name="Connecteur droit 256"/>
           <p:cNvCxnSpPr/>
           <p:nvPr/>
         </p:nvCxnSpPr>
         <p:spPr>
           <a:xfrm>
-            <a:off x="3502420" y="3271316"/>
+            <a:off x="3502420" y="4557408"/>
             <a:ext cx="360040" cy="0"/>
           </a:xfrm>
           <a:prstGeom prst="line">
@@ -3285,13 +3285,13 @@
       </p:cxnSp>
       <p:cxnSp>
         <p:nvCxnSpPr>
-          <p:cNvPr id="175" name="Connecteur droit 174"/>
+          <p:cNvPr id="258" name="Connecteur droit 257"/>
           <p:cNvCxnSpPr/>
           <p:nvPr/>
         </p:nvCxnSpPr>
         <p:spPr>
           <a:xfrm>
-            <a:off x="3502420" y="3394800"/>
+            <a:off x="3502420" y="4680892"/>
             <a:ext cx="360040" cy="0"/>
           </a:xfrm>
           <a:prstGeom prst="line">
@@ -3316,13 +3316,13 @@
       </p:cxnSp>
       <p:cxnSp>
         <p:nvCxnSpPr>
-          <p:cNvPr id="176" name="Connecteur droit 175"/>
+          <p:cNvPr id="259" name="Connecteur droit 258"/>
           <p:cNvCxnSpPr/>
           <p:nvPr/>
         </p:nvCxnSpPr>
         <p:spPr>
           <a:xfrm>
-            <a:off x="2782340" y="2970336"/>
+            <a:off x="2782340" y="4256428"/>
             <a:ext cx="720080" cy="0"/>
           </a:xfrm>
           <a:prstGeom prst="line">
@@ -3349,13 +3349,13 @@
       </p:cxnSp>
       <p:cxnSp>
         <p:nvCxnSpPr>
-          <p:cNvPr id="177" name="Connecteur droit 176"/>
+          <p:cNvPr id="260" name="Connecteur droit 259"/>
           <p:cNvCxnSpPr/>
           <p:nvPr/>
         </p:nvCxnSpPr>
         <p:spPr>
           <a:xfrm>
-            <a:off x="2782340" y="2970336"/>
+            <a:off x="2782340" y="4256428"/>
             <a:ext cx="720080" cy="300980"/>
           </a:xfrm>
           <a:prstGeom prst="line">
@@ -3382,13 +3382,13 @@
       </p:cxnSp>
       <p:cxnSp>
         <p:nvCxnSpPr>
-          <p:cNvPr id="178" name="Connecteur droit 177"/>
+          <p:cNvPr id="261" name="Connecteur droit 260"/>
           <p:cNvCxnSpPr/>
           <p:nvPr/>
         </p:nvCxnSpPr>
         <p:spPr>
           <a:xfrm>
-            <a:off x="2782340" y="2970336"/>
+            <a:off x="2782340" y="4256428"/>
             <a:ext cx="727920" cy="424464"/>
           </a:xfrm>
           <a:prstGeom prst="line">
@@ -3415,13 +3415,13 @@
       </p:cxnSp>
       <p:sp>
         <p:nvSpPr>
-          <p:cNvPr id="179" name="ZoneTexte 178"/>
+          <p:cNvPr id="262" name="ZoneTexte 261"/>
           <p:cNvSpPr txBox="1"/>
           <p:nvPr/>
         </p:nvSpPr>
         <p:spPr>
           <a:xfrm>
-            <a:off x="-18817" y="18008"/>
+            <a:off x="-18817" y="-35967"/>
             <a:ext cx="777777" cy="307777"/>
           </a:xfrm>
           <a:prstGeom prst="rect">
@@ -3451,13 +3451,13 @@
       </p:sp>
       <p:sp>
         <p:nvSpPr>
-          <p:cNvPr id="180" name="ZoneTexte 179"/>
+          <p:cNvPr id="263" name="ZoneTexte 262"/>
           <p:cNvSpPr txBox="1"/>
           <p:nvPr/>
         </p:nvSpPr>
         <p:spPr>
           <a:xfrm>
-            <a:off x="912713" y="18008"/>
+            <a:off x="912713" y="-35967"/>
             <a:ext cx="1077539" cy="523220"/>
           </a:xfrm>
           <a:prstGeom prst="rect">
@@ -3530,13 +3530,13 @@
       </p:sp>
       <p:sp>
         <p:nvSpPr>
-          <p:cNvPr id="181" name="ZoneTexte 180"/>
+          <p:cNvPr id="264" name="ZoneTexte 263"/>
           <p:cNvSpPr txBox="1"/>
           <p:nvPr/>
         </p:nvSpPr>
         <p:spPr>
           <a:xfrm>
-            <a:off x="2028648" y="18008"/>
+            <a:off x="2028648" y="-35967"/>
             <a:ext cx="1192955" cy="523220"/>
           </a:xfrm>
           <a:prstGeom prst="rect">
@@ -3612,13 +3612,13 @@
       </p:sp>
       <p:sp>
         <p:nvSpPr>
-          <p:cNvPr id="182" name="ZoneTexte 181"/>
+          <p:cNvPr id="265" name="ZoneTexte 264"/>
           <p:cNvSpPr txBox="1"/>
           <p:nvPr/>
         </p:nvSpPr>
         <p:spPr>
           <a:xfrm>
-            <a:off x="3243620" y="18008"/>
+            <a:off x="3243620" y="-35967"/>
             <a:ext cx="950902" cy="307777"/>
           </a:xfrm>
           <a:prstGeom prst="rect">
@@ -3656,13 +3656,13 @@
       </p:sp>
       <p:sp>
         <p:nvSpPr>
-          <p:cNvPr id="183" name="Rectangle 182"/>
+          <p:cNvPr id="266" name="Rectangle 265"/>
           <p:cNvSpPr/>
           <p:nvPr/>
         </p:nvSpPr>
         <p:spPr>
           <a:xfrm>
-            <a:off x="213883" y="2662559"/>
+            <a:off x="213883" y="3948651"/>
             <a:ext cx="343364" cy="307777"/>
           </a:xfrm>
           <a:prstGeom prst="rect">
@@ -3695,13 +3695,13 @@
       </p:sp>
       <p:sp>
         <p:nvSpPr>
-          <p:cNvPr id="184" name="Rectangle 183"/>
+          <p:cNvPr id="267" name="Rectangle 266"/>
           <p:cNvSpPr/>
           <p:nvPr/>
         </p:nvSpPr>
         <p:spPr>
           <a:xfrm>
-            <a:off x="1273734" y="2651859"/>
+            <a:off x="1273734" y="3937951"/>
             <a:ext cx="433132" cy="307777"/>
           </a:xfrm>
           <a:prstGeom prst="rect">
@@ -3741,13 +3741,13 @@
       </p:sp>
       <p:cxnSp>
         <p:nvCxnSpPr>
-          <p:cNvPr id="185" name="Connecteur droit 184"/>
+          <p:cNvPr id="268" name="Connecteur droit 267"/>
           <p:cNvCxnSpPr/>
           <p:nvPr/>
         </p:nvCxnSpPr>
         <p:spPr>
           <a:xfrm>
-            <a:off x="478084" y="2970336"/>
+            <a:off x="478084" y="4256428"/>
             <a:ext cx="792088" cy="0"/>
           </a:xfrm>
           <a:prstGeom prst="line">
@@ -3774,14 +3774,14 @@
       </p:cxnSp>
       <p:cxnSp>
         <p:nvCxnSpPr>
-          <p:cNvPr id="186" name="Connecteur droit 185"/>
+          <p:cNvPr id="269" name="Connecteur droit 268"/>
           <p:cNvCxnSpPr/>
           <p:nvPr/>
         </p:nvCxnSpPr>
         <p:spPr>
           <a:xfrm>
-            <a:off x="190052" y="765468"/>
-            <a:ext cx="360040" cy="0"/>
+            <a:off x="197892" y="2051561"/>
+            <a:ext cx="336209" cy="0"/>
           </a:xfrm>
           <a:prstGeom prst="line">
             <a:avLst/>
@@ -3805,13 +3805,13 @@
       </p:cxnSp>
       <p:sp>
         <p:nvSpPr>
-          <p:cNvPr id="187" name="Rectangle 186"/>
+          <p:cNvPr id="270" name="Rectangle 269"/>
           <p:cNvSpPr/>
           <p:nvPr/>
         </p:nvSpPr>
         <p:spPr>
           <a:xfrm>
-            <a:off x="188961" y="450056"/>
+            <a:off x="179086" y="1748139"/>
             <a:ext cx="373820" cy="307777"/>
           </a:xfrm>
           <a:prstGeom prst="rect">
@@ -3844,13 +3844,13 @@
       </p:sp>
       <p:cxnSp>
         <p:nvCxnSpPr>
-          <p:cNvPr id="188" name="Connecteur droit 187"/>
+          <p:cNvPr id="271" name="Connecteur droit 270"/>
           <p:cNvCxnSpPr/>
           <p:nvPr/>
         </p:nvCxnSpPr>
         <p:spPr>
           <a:xfrm>
-            <a:off x="1270172" y="1231200"/>
+            <a:off x="1270172" y="2517292"/>
             <a:ext cx="360040" cy="0"/>
           </a:xfrm>
           <a:prstGeom prst="line">
@@ -3875,13 +3875,13 @@
       </p:cxnSp>
       <p:cxnSp>
         <p:nvCxnSpPr>
-          <p:cNvPr id="189" name="Connecteur droit 188"/>
+          <p:cNvPr id="272" name="Connecteur droit 271"/>
           <p:cNvCxnSpPr/>
           <p:nvPr/>
         </p:nvCxnSpPr>
         <p:spPr>
           <a:xfrm>
-            <a:off x="550092" y="765468"/>
+            <a:off x="550092" y="2051560"/>
             <a:ext cx="741208" cy="476676"/>
           </a:xfrm>
           <a:prstGeom prst="line">
@@ -3908,13 +3908,13 @@
       </p:cxnSp>
       <p:sp>
         <p:nvSpPr>
-          <p:cNvPr id="190" name="Rectangle 189"/>
+          <p:cNvPr id="273" name="Rectangle 272"/>
           <p:cNvSpPr/>
           <p:nvPr/>
         </p:nvSpPr>
         <p:spPr>
           <a:xfrm>
-            <a:off x="1637367" y="1078383"/>
+            <a:off x="1637367" y="2364475"/>
             <a:ext cx="412292" cy="307777"/>
           </a:xfrm>
           <a:prstGeom prst="rect">
@@ -3954,13 +3954,13 @@
       </p:sp>
       <p:cxnSp>
         <p:nvCxnSpPr>
-          <p:cNvPr id="191" name="Connecteur droit avec flèche 190"/>
+          <p:cNvPr id="274" name="Connecteur droit avec flèche 273"/>
           <p:cNvCxnSpPr/>
           <p:nvPr/>
         </p:nvCxnSpPr>
         <p:spPr>
           <a:xfrm>
-            <a:off x="1441062" y="1386160"/>
+            <a:off x="1441062" y="2672252"/>
             <a:ext cx="0" cy="1201015"/>
           </a:xfrm>
           <a:prstGeom prst="straightConnector1">
@@ -3988,7 +3988,7 @@
       </p:cxnSp>
       <p:sp>
         <p:nvSpPr>
-          <p:cNvPr id="192" name="TextBox 7"/>
+          <p:cNvPr id="275" name="TextBox 7"/>
           <p:cNvSpPr txBox="1">
             <a:spLocks noChangeArrowheads="1"/>
           </p:cNvSpPr>
@@ -3996,7 +3996,7 @@
         </p:nvSpPr>
         <p:spPr bwMode="auto">
           <a:xfrm>
-            <a:off x="1422285" y="1857110"/>
+            <a:off x="1422285" y="3143202"/>
             <a:ext cx="1002044" cy="307777"/>
           </a:xfrm>
           <a:prstGeom prst="rect">
@@ -4146,13 +4146,13 @@
       </p:sp>
       <p:sp>
         <p:nvSpPr>
-          <p:cNvPr id="193" name="ZoneTexte 192"/>
+          <p:cNvPr id="276" name="ZoneTexte 275"/>
           <p:cNvSpPr txBox="1"/>
           <p:nvPr/>
         </p:nvSpPr>
         <p:spPr>
           <a:xfrm rot="10800000" flipV="1">
-            <a:off x="2038857" y="821457"/>
+            <a:off x="2038857" y="2107549"/>
             <a:ext cx="482824" cy="307777"/>
           </a:xfrm>
           <a:prstGeom prst="rect">
@@ -4182,13 +4182,13 @@
       </p:sp>
       <p:cxnSp>
         <p:nvCxnSpPr>
-          <p:cNvPr id="194" name="Connecteur droit 193"/>
+          <p:cNvPr id="277" name="Connecteur droit 276"/>
           <p:cNvCxnSpPr/>
           <p:nvPr/>
         </p:nvCxnSpPr>
         <p:spPr>
           <a:xfrm>
-            <a:off x="1261042" y="954112"/>
+            <a:off x="1261042" y="2240204"/>
             <a:ext cx="360040" cy="0"/>
           </a:xfrm>
           <a:prstGeom prst="line">
@@ -4213,13 +4213,13 @@
       </p:cxnSp>
       <p:cxnSp>
         <p:nvCxnSpPr>
-          <p:cNvPr id="195" name="Connecteur droit 194"/>
+          <p:cNvPr id="278" name="Connecteur droit 277"/>
           <p:cNvCxnSpPr/>
           <p:nvPr/>
         </p:nvCxnSpPr>
         <p:spPr>
           <a:xfrm>
-            <a:off x="1261042" y="738088"/>
+            <a:off x="1261042" y="2024180"/>
             <a:ext cx="360040" cy="0"/>
           </a:xfrm>
           <a:prstGeom prst="line">
@@ -4244,13 +4244,13 @@
       </p:cxnSp>
       <p:cxnSp>
         <p:nvCxnSpPr>
-          <p:cNvPr id="196" name="Connecteur droit 195"/>
+          <p:cNvPr id="279" name="Connecteur droit 278"/>
           <p:cNvCxnSpPr/>
           <p:nvPr/>
         </p:nvCxnSpPr>
         <p:spPr>
           <a:xfrm>
-            <a:off x="1261042" y="805086"/>
+            <a:off x="1261042" y="2091178"/>
             <a:ext cx="360040" cy="0"/>
           </a:xfrm>
           <a:prstGeom prst="line">
@@ -4275,13 +4275,13 @@
       </p:cxnSp>
       <p:sp>
         <p:nvSpPr>
-          <p:cNvPr id="197" name="Rectangle 196"/>
+          <p:cNvPr id="280" name="Rectangle 279"/>
           <p:cNvSpPr/>
           <p:nvPr/>
         </p:nvSpPr>
         <p:spPr>
           <a:xfrm>
-            <a:off x="1649804" y="841242"/>
+            <a:off x="1649804" y="2127334"/>
             <a:ext cx="412292" cy="307777"/>
           </a:xfrm>
           <a:prstGeom prst="rect">
@@ -4321,13 +4321,13 @@
       </p:sp>
       <p:sp>
         <p:nvSpPr>
-          <p:cNvPr id="198" name="Rectangle 197"/>
+          <p:cNvPr id="281" name="Rectangle 280"/>
           <p:cNvSpPr/>
           <p:nvPr/>
         </p:nvSpPr>
         <p:spPr>
           <a:xfrm>
-            <a:off x="1630212" y="571513"/>
+            <a:off x="1630212" y="1857605"/>
             <a:ext cx="662361" cy="307777"/>
           </a:xfrm>
           <a:prstGeom prst="rect">
@@ -4388,13 +4388,13 @@
       </p:sp>
       <p:cxnSp>
         <p:nvCxnSpPr>
-          <p:cNvPr id="199" name="Connecteur droit 198"/>
+          <p:cNvPr id="282" name="Connecteur droit 281"/>
           <p:cNvCxnSpPr/>
           <p:nvPr/>
         </p:nvCxnSpPr>
         <p:spPr>
           <a:xfrm>
-            <a:off x="540962" y="765468"/>
+            <a:off x="540962" y="2051560"/>
             <a:ext cx="732772" cy="188644"/>
           </a:xfrm>
           <a:prstGeom prst="line">
@@ -4421,13 +4421,13 @@
       </p:cxnSp>
       <p:cxnSp>
         <p:nvCxnSpPr>
-          <p:cNvPr id="200" name="Connecteur droit 199"/>
+          <p:cNvPr id="283" name="Connecteur droit 282"/>
           <p:cNvCxnSpPr/>
           <p:nvPr/>
         </p:nvCxnSpPr>
         <p:spPr>
           <a:xfrm>
-            <a:off x="528964" y="762119"/>
+            <a:off x="528964" y="2048211"/>
             <a:ext cx="741208" cy="42967"/>
           </a:xfrm>
           <a:prstGeom prst="line">
@@ -4454,13 +4454,13 @@
       </p:cxnSp>
       <p:cxnSp>
         <p:nvCxnSpPr>
-          <p:cNvPr id="201" name="Connecteur droit 200"/>
+          <p:cNvPr id="284" name="Connecteur droit 283"/>
           <p:cNvCxnSpPr/>
           <p:nvPr/>
         </p:nvCxnSpPr>
         <p:spPr>
           <a:xfrm flipV="1">
-            <a:off x="540962" y="738088"/>
+            <a:off x="540962" y="2024180"/>
             <a:ext cx="750338" cy="24031"/>
           </a:xfrm>
           <a:prstGeom prst="line">
@@ -4485,6 +4485,369 @@
           </a:fontRef>
         </p:style>
       </p:cxnSp>
+      <p:sp>
+        <p:nvSpPr>
+          <p:cNvPr id="285" name="ZoneTexte 284"/>
+          <p:cNvSpPr txBox="1"/>
+          <p:nvPr/>
+        </p:nvSpPr>
+        <p:spPr>
+          <a:xfrm>
+            <a:off x="1203246" y="547387"/>
+            <a:ext cx="650830" cy="402955"/>
+          </a:xfrm>
+          <a:prstGeom prst="rect">
+            <a:avLst/>
+          </a:prstGeom>
+          <a:noFill/>
+        </p:spPr>
+        <p:txBody>
+          <a:bodyPr wrap="none" rtlCol="0">
+            <a:spAutoFit/>
+          </a:bodyPr>
+          <a:lstStyle/>
+          <a:p>
+            <a:r>
+              <a:rPr lang="fr-FR" sz="1400" dirty="0" smtClean="0">
+                <a:latin typeface="Times New Roman" panose="02020603050405020304" pitchFamily="18" charset="0"/>
+                <a:cs typeface="Times New Roman" panose="02020603050405020304" pitchFamily="18" charset="0"/>
+              </a:rPr>
+              <a:t>(…)</a:t>
+            </a:r>
+            <a:endParaRPr lang="en-US" sz="1400" dirty="0">
+              <a:latin typeface="Times New Roman" panose="02020603050405020304" pitchFamily="18" charset="0"/>
+              <a:cs typeface="Times New Roman" panose="02020603050405020304" pitchFamily="18" charset="0"/>
+            </a:endParaRPr>
+          </a:p>
+        </p:txBody>
+      </p:sp>
+      <p:sp>
+        <p:nvSpPr>
+          <p:cNvPr id="286" name="ZoneTexte 285"/>
+          <p:cNvSpPr txBox="1"/>
+          <p:nvPr/>
+        </p:nvSpPr>
+        <p:spPr>
+          <a:xfrm>
+            <a:off x="1203246" y="964888"/>
+            <a:ext cx="650830" cy="402955"/>
+          </a:xfrm>
+          <a:prstGeom prst="rect">
+            <a:avLst/>
+          </a:prstGeom>
+          <a:noFill/>
+        </p:spPr>
+        <p:txBody>
+          <a:bodyPr wrap="none" rtlCol="0">
+            <a:spAutoFit/>
+          </a:bodyPr>
+          <a:lstStyle/>
+          <a:p>
+            <a:r>
+              <a:rPr lang="fr-FR" sz="1400" dirty="0" smtClean="0">
+                <a:latin typeface="Times New Roman" panose="02020603050405020304" pitchFamily="18" charset="0"/>
+                <a:cs typeface="Times New Roman" panose="02020603050405020304" pitchFamily="18" charset="0"/>
+              </a:rPr>
+              <a:t>(…)</a:t>
+            </a:r>
+            <a:endParaRPr lang="en-US" sz="1400" dirty="0">
+              <a:latin typeface="Times New Roman" panose="02020603050405020304" pitchFamily="18" charset="0"/>
+              <a:cs typeface="Times New Roman" panose="02020603050405020304" pitchFamily="18" charset="0"/>
+            </a:endParaRPr>
+          </a:p>
+        </p:txBody>
+      </p:sp>
+      <p:sp>
+        <p:nvSpPr>
+          <p:cNvPr id="287" name="ZoneTexte 286"/>
+          <p:cNvSpPr txBox="1"/>
+          <p:nvPr/>
+        </p:nvSpPr>
+        <p:spPr>
+          <a:xfrm>
+            <a:off x="1214323" y="1396936"/>
+            <a:ext cx="650830" cy="402955"/>
+          </a:xfrm>
+          <a:prstGeom prst="rect">
+            <a:avLst/>
+          </a:prstGeom>
+          <a:noFill/>
+        </p:spPr>
+        <p:txBody>
+          <a:bodyPr wrap="none" rtlCol="0">
+            <a:spAutoFit/>
+          </a:bodyPr>
+          <a:lstStyle/>
+          <a:p>
+            <a:r>
+              <a:rPr lang="fr-FR" sz="1400" dirty="0" smtClean="0">
+                <a:latin typeface="Times New Roman" panose="02020603050405020304" pitchFamily="18" charset="0"/>
+                <a:cs typeface="Times New Roman" panose="02020603050405020304" pitchFamily="18" charset="0"/>
+              </a:rPr>
+              <a:t>(…)</a:t>
+            </a:r>
+            <a:endParaRPr lang="en-US" sz="1400" dirty="0">
+              <a:latin typeface="Times New Roman" panose="02020603050405020304" pitchFamily="18" charset="0"/>
+              <a:cs typeface="Times New Roman" panose="02020603050405020304" pitchFamily="18" charset="0"/>
+            </a:endParaRPr>
+          </a:p>
+        </p:txBody>
+      </p:sp>
+      <p:grpSp>
+        <p:nvGrpSpPr>
+          <p:cNvPr id="288" name="Groupe 287"/>
+          <p:cNvGrpSpPr/>
+          <p:nvPr/>
+        </p:nvGrpSpPr>
+        <p:grpSpPr>
+          <a:xfrm>
+            <a:off x="184112" y="1294562"/>
+            <a:ext cx="355015" cy="307777"/>
+            <a:chOff x="184112" y="1258738"/>
+            <a:chExt cx="355015" cy="307777"/>
+          </a:xfrm>
+        </p:grpSpPr>
+        <p:cxnSp>
+          <p:nvCxnSpPr>
+            <p:cNvPr id="289" name="Connecteur droit 288"/>
+            <p:cNvCxnSpPr/>
+            <p:nvPr/>
+          </p:nvCxnSpPr>
+          <p:spPr>
+            <a:xfrm>
+              <a:off x="202918" y="1562160"/>
+              <a:ext cx="336209" cy="0"/>
+            </a:xfrm>
+            <a:prstGeom prst="line">
+              <a:avLst/>
+            </a:prstGeom>
+            <a:ln w="28575"/>
+          </p:spPr>
+          <p:style>
+            <a:lnRef idx="1">
+              <a:schemeClr val="dk1"/>
+            </a:lnRef>
+            <a:fillRef idx="0">
+              <a:schemeClr val="dk1"/>
+            </a:fillRef>
+            <a:effectRef idx="0">
+              <a:schemeClr val="dk1"/>
+            </a:effectRef>
+            <a:fontRef idx="minor">
+              <a:schemeClr val="tx1"/>
+            </a:fontRef>
+          </p:style>
+        </p:cxnSp>
+        <p:sp>
+          <p:nvSpPr>
+            <p:cNvPr id="290" name="Rectangle 289"/>
+            <p:cNvSpPr/>
+            <p:nvPr/>
+          </p:nvSpPr>
+          <p:spPr>
+            <a:xfrm>
+              <a:off x="184112" y="1258738"/>
+              <a:ext cx="343364" cy="307777"/>
+            </a:xfrm>
+            <a:prstGeom prst="rect">
+              <a:avLst/>
+            </a:prstGeom>
+          </p:spPr>
+          <p:txBody>
+            <a:bodyPr wrap="none">
+              <a:spAutoFit/>
+            </a:bodyPr>
+            <a:lstStyle/>
+            <a:p>
+              <a:r>
+                <a:rPr lang="fr-FR" sz="1400" baseline="30000" dirty="0" smtClean="0">
+                  <a:latin typeface="Times New Roman" panose="02020603050405020304" pitchFamily="18" charset="0"/>
+                  <a:cs typeface="Times New Roman" panose="02020603050405020304" pitchFamily="18" charset="0"/>
+                </a:rPr>
+                <a:t>4</a:t>
+              </a:r>
+              <a:r>
+                <a:rPr lang="fr-FR" sz="1400" dirty="0">
+                  <a:latin typeface="Times New Roman" panose="02020603050405020304" pitchFamily="18" charset="0"/>
+                  <a:cs typeface="Times New Roman" panose="02020603050405020304" pitchFamily="18" charset="0"/>
+                </a:rPr>
+                <a:t>P</a:t>
+              </a:r>
+              <a:endParaRPr lang="en-US" sz="1400" dirty="0"/>
+            </a:p>
+          </p:txBody>
+        </p:sp>
+      </p:grpSp>
+      <p:grpSp>
+        <p:nvGrpSpPr>
+          <p:cNvPr id="291" name="Groupe 290"/>
+          <p:cNvGrpSpPr/>
+          <p:nvPr/>
+        </p:nvGrpSpPr>
+        <p:grpSpPr>
+          <a:xfrm>
+            <a:off x="185947" y="862562"/>
+            <a:ext cx="373820" cy="307777"/>
+            <a:chOff x="184112" y="1258738"/>
+            <a:chExt cx="373820" cy="307777"/>
+          </a:xfrm>
+        </p:grpSpPr>
+        <p:cxnSp>
+          <p:nvCxnSpPr>
+            <p:cNvPr id="292" name="Connecteur droit 291"/>
+            <p:cNvCxnSpPr/>
+            <p:nvPr/>
+          </p:nvCxnSpPr>
+          <p:spPr>
+            <a:xfrm>
+              <a:off x="202918" y="1562160"/>
+              <a:ext cx="336209" cy="0"/>
+            </a:xfrm>
+            <a:prstGeom prst="line">
+              <a:avLst/>
+            </a:prstGeom>
+            <a:ln w="28575"/>
+          </p:spPr>
+          <p:style>
+            <a:lnRef idx="1">
+              <a:schemeClr val="dk1"/>
+            </a:lnRef>
+            <a:fillRef idx="0">
+              <a:schemeClr val="dk1"/>
+            </a:fillRef>
+            <a:effectRef idx="0">
+              <a:schemeClr val="dk1"/>
+            </a:effectRef>
+            <a:fontRef idx="minor">
+              <a:schemeClr val="tx1"/>
+            </a:fontRef>
+          </p:style>
+        </p:cxnSp>
+        <p:sp>
+          <p:nvSpPr>
+            <p:cNvPr id="293" name="Rectangle 292"/>
+            <p:cNvSpPr/>
+            <p:nvPr/>
+          </p:nvSpPr>
+          <p:spPr>
+            <a:xfrm>
+              <a:off x="184112" y="1258738"/>
+              <a:ext cx="373820" cy="307777"/>
+            </a:xfrm>
+            <a:prstGeom prst="rect">
+              <a:avLst/>
+            </a:prstGeom>
+          </p:spPr>
+          <p:txBody>
+            <a:bodyPr wrap="none">
+              <a:spAutoFit/>
+            </a:bodyPr>
+            <a:lstStyle/>
+            <a:p>
+              <a:r>
+                <a:rPr lang="fr-FR" sz="1400" baseline="30000" dirty="0" smtClean="0">
+                  <a:latin typeface="Times New Roman" panose="02020603050405020304" pitchFamily="18" charset="0"/>
+                  <a:cs typeface="Times New Roman" panose="02020603050405020304" pitchFamily="18" charset="0"/>
+                </a:rPr>
+                <a:t>4</a:t>
+              </a:r>
+              <a:r>
+                <a:rPr lang="fr-FR" sz="1400" dirty="0">
+                  <a:latin typeface="Times New Roman" panose="02020603050405020304" pitchFamily="18" charset="0"/>
+                  <a:cs typeface="Times New Roman" panose="02020603050405020304" pitchFamily="18" charset="0"/>
+                </a:rPr>
+                <a:t>D</a:t>
+              </a:r>
+              <a:endParaRPr lang="en-US" sz="1400" dirty="0"/>
+            </a:p>
+          </p:txBody>
+        </p:sp>
+      </p:grpSp>
+      <p:grpSp>
+        <p:nvGrpSpPr>
+          <p:cNvPr id="294" name="Groupe 293"/>
+          <p:cNvGrpSpPr/>
+          <p:nvPr/>
+        </p:nvGrpSpPr>
+        <p:grpSpPr>
+          <a:xfrm>
+            <a:off x="184112" y="430562"/>
+            <a:ext cx="355015" cy="307777"/>
+            <a:chOff x="184112" y="1258738"/>
+            <a:chExt cx="355015" cy="307777"/>
+          </a:xfrm>
+        </p:grpSpPr>
+        <p:cxnSp>
+          <p:nvCxnSpPr>
+            <p:cNvPr id="295" name="Connecteur droit 294"/>
+            <p:cNvCxnSpPr/>
+            <p:nvPr/>
+          </p:nvCxnSpPr>
+          <p:spPr>
+            <a:xfrm>
+              <a:off x="202918" y="1562160"/>
+              <a:ext cx="336209" cy="0"/>
+            </a:xfrm>
+            <a:prstGeom prst="line">
+              <a:avLst/>
+            </a:prstGeom>
+            <a:ln w="28575"/>
+          </p:spPr>
+          <p:style>
+            <a:lnRef idx="1">
+              <a:schemeClr val="dk1"/>
+            </a:lnRef>
+            <a:fillRef idx="0">
+              <a:schemeClr val="dk1"/>
+            </a:fillRef>
+            <a:effectRef idx="0">
+              <a:schemeClr val="dk1"/>
+            </a:effectRef>
+            <a:fontRef idx="minor">
+              <a:schemeClr val="tx1"/>
+            </a:fontRef>
+          </p:style>
+        </p:cxnSp>
+        <p:sp>
+          <p:nvSpPr>
+            <p:cNvPr id="296" name="Rectangle 295"/>
+            <p:cNvSpPr/>
+            <p:nvPr/>
+          </p:nvSpPr>
+          <p:spPr>
+            <a:xfrm>
+              <a:off x="184112" y="1258738"/>
+              <a:ext cx="343364" cy="307777"/>
+            </a:xfrm>
+            <a:prstGeom prst="rect">
+              <a:avLst/>
+            </a:prstGeom>
+          </p:spPr>
+          <p:txBody>
+            <a:bodyPr wrap="none">
+              <a:spAutoFit/>
+            </a:bodyPr>
+            <a:lstStyle/>
+            <a:p>
+              <a:r>
+                <a:rPr lang="fr-FR" sz="1400" baseline="30000" dirty="0" smtClean="0">
+                  <a:latin typeface="Times New Roman" panose="02020603050405020304" pitchFamily="18" charset="0"/>
+                  <a:cs typeface="Times New Roman" panose="02020603050405020304" pitchFamily="18" charset="0"/>
+                </a:rPr>
+                <a:t>4</a:t>
+              </a:r>
+              <a:r>
+                <a:rPr lang="fr-FR" sz="1400" dirty="0">
+                  <a:latin typeface="Times New Roman" panose="02020603050405020304" pitchFamily="18" charset="0"/>
+                  <a:cs typeface="Times New Roman" panose="02020603050405020304" pitchFamily="18" charset="0"/>
+                </a:rPr>
+                <a:t>F</a:t>
+              </a:r>
+              <a:endParaRPr lang="en-US" sz="1400" dirty="0"/>
+            </a:p>
+          </p:txBody>
+        </p:sp>
+      </p:grpSp>
     </p:spTree>
     <p:extLst>
       <p:ext uri="{BB962C8B-B14F-4D97-AF65-F5344CB8AC3E}">

</xml_diff>

<commit_message>
Chap01: Herve correction almost ended, missing reference in I.1.1
</commit_message>
<xml_diff>
--- a/01-QD/Pictures/MnCrystal.pptx
+++ b/01-QD/Pictures/MnCrystal.pptx
@@ -7,7 +7,7 @@
   <p:sldIdLst>
     <p:sldId id="256" r:id="rId2"/>
   </p:sldIdLst>
-  <p:sldSz cx="4140200" cy="4789488"/>
+  <p:sldSz cx="4392613" cy="3600450"/>
   <p:notesSz cx="6858000" cy="9144000"/>
   <p:defaultTextStyle>
     <a:defPPr>
@@ -136,8 +136,8 @@
         </p:nvSpPr>
         <p:spPr>
           <a:xfrm>
-            <a:off x="310516" y="1487849"/>
-            <a:ext cx="3519170" cy="1026634"/>
+            <a:off x="329451" y="1118475"/>
+            <a:ext cx="3733721" cy="771762"/>
           </a:xfrm>
         </p:spPr>
         <p:txBody>
@@ -164,8 +164,8 @@
         </p:nvSpPr>
         <p:spPr>
           <a:xfrm>
-            <a:off x="621030" y="2714047"/>
-            <a:ext cx="2898140" cy="1223979"/>
+            <a:off x="658892" y="2040261"/>
+            <a:ext cx="3074830" cy="920114"/>
           </a:xfrm>
         </p:spPr>
         <p:txBody>
@@ -288,7 +288,7 @@
           <a:p>
             <a:fld id="{5D25FA07-FE11-48AD-AB24-E261AC47F041}" type="datetimeFigureOut">
               <a:rPr lang="fr-FR" smtClean="0"/>
-              <a:t>17/07/2017</a:t>
+              <a:t>09/10/2017</a:t>
             </a:fld>
             <a:endParaRPr lang="fr-FR"/>
           </a:p>
@@ -458,7 +458,7 @@
           <a:p>
             <a:fld id="{5D25FA07-FE11-48AD-AB24-E261AC47F041}" type="datetimeFigureOut">
               <a:rPr lang="fr-FR" smtClean="0"/>
-              <a:t>17/07/2017</a:t>
+              <a:t>09/10/2017</a:t>
             </a:fld>
             <a:endParaRPr lang="fr-FR"/>
           </a:p>
@@ -548,8 +548,8 @@
         </p:nvSpPr>
         <p:spPr>
           <a:xfrm>
-            <a:off x="3001645" y="191804"/>
-            <a:ext cx="931546" cy="4086585"/>
+            <a:off x="3184648" y="144190"/>
+            <a:ext cx="988339" cy="3072049"/>
           </a:xfrm>
         </p:spPr>
         <p:txBody>
@@ -576,8 +576,8 @@
         </p:nvSpPr>
         <p:spPr>
           <a:xfrm>
-            <a:off x="207017" y="191804"/>
-            <a:ext cx="2725631" cy="4086585"/>
+            <a:off x="219643" y="144190"/>
+            <a:ext cx="2891803" cy="3072049"/>
           </a:xfrm>
         </p:spPr>
         <p:txBody>
@@ -638,7 +638,7 @@
           <a:p>
             <a:fld id="{5D25FA07-FE11-48AD-AB24-E261AC47F041}" type="datetimeFigureOut">
               <a:rPr lang="fr-FR" smtClean="0"/>
-              <a:t>17/07/2017</a:t>
+              <a:t>09/10/2017</a:t>
             </a:fld>
             <a:endParaRPr lang="fr-FR"/>
           </a:p>
@@ -808,7 +808,7 @@
           <a:p>
             <a:fld id="{5D25FA07-FE11-48AD-AB24-E261AC47F041}" type="datetimeFigureOut">
               <a:rPr lang="fr-FR" smtClean="0"/>
-              <a:t>17/07/2017</a:t>
+              <a:t>09/10/2017</a:t>
             </a:fld>
             <a:endParaRPr lang="fr-FR"/>
           </a:p>
@@ -898,8 +898,8 @@
         </p:nvSpPr>
         <p:spPr>
           <a:xfrm>
-            <a:off x="327048" y="3077693"/>
-            <a:ext cx="3519170" cy="951246"/>
+            <a:off x="346991" y="2313625"/>
+            <a:ext cx="3733721" cy="715090"/>
           </a:xfrm>
         </p:spPr>
         <p:txBody>
@@ -930,8 +930,8 @@
         </p:nvSpPr>
         <p:spPr>
           <a:xfrm>
-            <a:off x="327048" y="2029993"/>
-            <a:ext cx="3519170" cy="1047699"/>
+            <a:off x="346991" y="1526029"/>
+            <a:ext cx="3733721" cy="787598"/>
           </a:xfrm>
         </p:spPr>
         <p:txBody>
@@ -1054,7 +1054,7 @@
           <a:p>
             <a:fld id="{5D25FA07-FE11-48AD-AB24-E261AC47F041}" type="datetimeFigureOut">
               <a:rPr lang="fr-FR" smtClean="0"/>
-              <a:t>17/07/2017</a:t>
+              <a:t>09/10/2017</a:t>
             </a:fld>
             <a:endParaRPr lang="fr-FR"/>
           </a:p>
@@ -1167,8 +1167,8 @@
         </p:nvSpPr>
         <p:spPr>
           <a:xfrm>
-            <a:off x="207011" y="1117550"/>
-            <a:ext cx="1828588" cy="3160842"/>
+            <a:off x="219635" y="840108"/>
+            <a:ext cx="1940071" cy="2376132"/>
           </a:xfrm>
         </p:spPr>
         <p:txBody>
@@ -1252,8 +1252,8 @@
         </p:nvSpPr>
         <p:spPr>
           <a:xfrm>
-            <a:off x="2104603" y="1117550"/>
-            <a:ext cx="1828588" cy="3160842"/>
+            <a:off x="2232916" y="840108"/>
+            <a:ext cx="1940071" cy="2376132"/>
           </a:xfrm>
         </p:spPr>
         <p:txBody>
@@ -1342,7 +1342,7 @@
           <a:p>
             <a:fld id="{5D25FA07-FE11-48AD-AB24-E261AC47F041}" type="datetimeFigureOut">
               <a:rPr lang="fr-FR" smtClean="0"/>
-              <a:t>17/07/2017</a:t>
+              <a:t>09/10/2017</a:t>
             </a:fld>
             <a:endParaRPr lang="fr-FR"/>
           </a:p>
@@ -1459,8 +1459,8 @@
         </p:nvSpPr>
         <p:spPr>
           <a:xfrm>
-            <a:off x="207016" y="1072094"/>
-            <a:ext cx="1829307" cy="446798"/>
+            <a:off x="219642" y="805937"/>
+            <a:ext cx="1940833" cy="335875"/>
           </a:xfrm>
         </p:spPr>
         <p:txBody>
@@ -1524,8 +1524,8 @@
         </p:nvSpPr>
         <p:spPr>
           <a:xfrm>
-            <a:off x="207016" y="1518890"/>
-            <a:ext cx="1829307" cy="2759501"/>
+            <a:off x="219642" y="1141813"/>
+            <a:ext cx="1940833" cy="2074428"/>
           </a:xfrm>
         </p:spPr>
         <p:txBody>
@@ -1609,8 +1609,8 @@
         </p:nvSpPr>
         <p:spPr>
           <a:xfrm>
-            <a:off x="2103168" y="1072094"/>
-            <a:ext cx="1830027" cy="446798"/>
+            <a:off x="2231391" y="805937"/>
+            <a:ext cx="1941598" cy="335875"/>
           </a:xfrm>
         </p:spPr>
         <p:txBody>
@@ -1674,8 +1674,8 @@
         </p:nvSpPr>
         <p:spPr>
           <a:xfrm>
-            <a:off x="2103168" y="1518890"/>
-            <a:ext cx="1830027" cy="2759501"/>
+            <a:off x="2231391" y="1141813"/>
+            <a:ext cx="1941598" cy="2074428"/>
           </a:xfrm>
         </p:spPr>
         <p:txBody>
@@ -1764,7 +1764,7 @@
           <a:p>
             <a:fld id="{5D25FA07-FE11-48AD-AB24-E261AC47F041}" type="datetimeFigureOut">
               <a:rPr lang="fr-FR" smtClean="0"/>
-              <a:t>17/07/2017</a:t>
+              <a:t>09/10/2017</a:t>
             </a:fld>
             <a:endParaRPr lang="fr-FR"/>
           </a:p>
@@ -1882,7 +1882,7 @@
           <a:p>
             <a:fld id="{5D25FA07-FE11-48AD-AB24-E261AC47F041}" type="datetimeFigureOut">
               <a:rPr lang="fr-FR" smtClean="0"/>
-              <a:t>17/07/2017</a:t>
+              <a:t>09/10/2017</a:t>
             </a:fld>
             <a:endParaRPr lang="fr-FR"/>
           </a:p>
@@ -1977,7 +1977,7 @@
           <a:p>
             <a:fld id="{5D25FA07-FE11-48AD-AB24-E261AC47F041}" type="datetimeFigureOut">
               <a:rPr lang="fr-FR" smtClean="0"/>
-              <a:t>17/07/2017</a:t>
+              <a:t>09/10/2017</a:t>
             </a:fld>
             <a:endParaRPr lang="fr-FR"/>
           </a:p>
@@ -2067,8 +2067,8 @@
         </p:nvSpPr>
         <p:spPr>
           <a:xfrm>
-            <a:off x="207015" y="190694"/>
-            <a:ext cx="1362097" cy="811551"/>
+            <a:off x="219636" y="143354"/>
+            <a:ext cx="1445140" cy="610075"/>
           </a:xfrm>
         </p:spPr>
         <p:txBody>
@@ -2099,8 +2099,8 @@
         </p:nvSpPr>
         <p:spPr>
           <a:xfrm>
-            <a:off x="1618709" y="190693"/>
-            <a:ext cx="2314487" cy="4087695"/>
+            <a:off x="1717400" y="143354"/>
+            <a:ext cx="2455593" cy="3072884"/>
           </a:xfrm>
         </p:spPr>
         <p:txBody>
@@ -2184,8 +2184,8 @@
         </p:nvSpPr>
         <p:spPr>
           <a:xfrm>
-            <a:off x="207015" y="1002246"/>
-            <a:ext cx="1362097" cy="3276143"/>
+            <a:off x="219636" y="753430"/>
+            <a:ext cx="1445140" cy="2462808"/>
           </a:xfrm>
         </p:spPr>
         <p:txBody>
@@ -2254,7 +2254,7 @@
           <a:p>
             <a:fld id="{5D25FA07-FE11-48AD-AB24-E261AC47F041}" type="datetimeFigureOut">
               <a:rPr lang="fr-FR" smtClean="0"/>
-              <a:t>17/07/2017</a:t>
+              <a:t>09/10/2017</a:t>
             </a:fld>
             <a:endParaRPr lang="fr-FR"/>
           </a:p>
@@ -2344,8 +2344,8 @@
         </p:nvSpPr>
         <p:spPr>
           <a:xfrm>
-            <a:off x="811508" y="3352644"/>
-            <a:ext cx="2484120" cy="395799"/>
+            <a:off x="860983" y="2520319"/>
+            <a:ext cx="2635568" cy="297538"/>
           </a:xfrm>
         </p:spPr>
         <p:txBody>
@@ -2376,8 +2376,8 @@
         </p:nvSpPr>
         <p:spPr>
           <a:xfrm>
-            <a:off x="811508" y="427952"/>
-            <a:ext cx="2484120" cy="2873693"/>
+            <a:off x="860983" y="321710"/>
+            <a:ext cx="2635568" cy="2160270"/>
           </a:xfrm>
         </p:spPr>
         <p:txBody>
@@ -2437,8 +2437,8 @@
         </p:nvSpPr>
         <p:spPr>
           <a:xfrm>
-            <a:off x="811508" y="3748443"/>
-            <a:ext cx="2484120" cy="562098"/>
+            <a:off x="860983" y="2817855"/>
+            <a:ext cx="2635568" cy="422552"/>
           </a:xfrm>
         </p:spPr>
         <p:txBody>
@@ -2507,7 +2507,7 @@
           <a:p>
             <a:fld id="{5D25FA07-FE11-48AD-AB24-E261AC47F041}" type="datetimeFigureOut">
               <a:rPr lang="fr-FR" smtClean="0"/>
-              <a:t>17/07/2017</a:t>
+              <a:t>09/10/2017</a:t>
             </a:fld>
             <a:endParaRPr lang="fr-FR"/>
           </a:p>
@@ -2602,8 +2602,8 @@
         </p:nvSpPr>
         <p:spPr>
           <a:xfrm>
-            <a:off x="207010" y="191803"/>
-            <a:ext cx="3726180" cy="798250"/>
+            <a:off x="219631" y="144186"/>
+            <a:ext cx="3953352" cy="600076"/>
           </a:xfrm>
           <a:prstGeom prst="rect">
             <a:avLst/>
@@ -2635,8 +2635,8 @@
         </p:nvSpPr>
         <p:spPr>
           <a:xfrm>
-            <a:off x="207010" y="1117550"/>
-            <a:ext cx="3726180" cy="3160842"/>
+            <a:off x="219631" y="840108"/>
+            <a:ext cx="3953352" cy="2376132"/>
           </a:xfrm>
           <a:prstGeom prst="rect">
             <a:avLst/>
@@ -2697,8 +2697,8 @@
         </p:nvSpPr>
         <p:spPr>
           <a:xfrm>
-            <a:off x="207016" y="4439149"/>
-            <a:ext cx="966047" cy="254994"/>
+            <a:off x="219637" y="3337087"/>
+            <a:ext cx="1024944" cy="191689"/>
           </a:xfrm>
           <a:prstGeom prst="rect">
             <a:avLst/>
@@ -2720,7 +2720,7 @@
           <a:p>
             <a:fld id="{5D25FA07-FE11-48AD-AB24-E261AC47F041}" type="datetimeFigureOut">
               <a:rPr lang="fr-FR" smtClean="0"/>
-              <a:t>17/07/2017</a:t>
+              <a:t>09/10/2017</a:t>
             </a:fld>
             <a:endParaRPr lang="fr-FR"/>
           </a:p>
@@ -2738,8 +2738,8 @@
         </p:nvSpPr>
         <p:spPr>
           <a:xfrm>
-            <a:off x="1414574" y="4439149"/>
-            <a:ext cx="1311063" cy="254994"/>
+            <a:off x="1500816" y="3337087"/>
+            <a:ext cx="1390994" cy="191689"/>
           </a:xfrm>
           <a:prstGeom prst="rect">
             <a:avLst/>
@@ -2775,8 +2775,8 @@
         </p:nvSpPr>
         <p:spPr>
           <a:xfrm>
-            <a:off x="2967149" y="4439149"/>
-            <a:ext cx="966047" cy="254994"/>
+            <a:off x="3148046" y="3337087"/>
+            <a:ext cx="1024944" cy="191689"/>
           </a:xfrm>
           <a:prstGeom prst="rect">
             <a:avLst/>
@@ -3097,13 +3097,13 @@
       </p:grpSpPr>
       <p:cxnSp>
         <p:nvCxnSpPr>
-          <p:cNvPr id="252" name="Connecteur droit 251"/>
+          <p:cNvPr id="212" name="Connecteur droit 211"/>
           <p:cNvCxnSpPr/>
           <p:nvPr/>
         </p:nvCxnSpPr>
         <p:spPr>
           <a:xfrm>
-            <a:off x="190052" y="4256092"/>
+            <a:off x="190052" y="3102497"/>
             <a:ext cx="360040" cy="0"/>
           </a:xfrm>
           <a:prstGeom prst="line">
@@ -3128,13 +3128,13 @@
       </p:cxnSp>
       <p:cxnSp>
         <p:nvCxnSpPr>
-          <p:cNvPr id="253" name="Connecteur droit 252"/>
+          <p:cNvPr id="213" name="Connecteur droit 212"/>
           <p:cNvCxnSpPr/>
           <p:nvPr/>
         </p:nvCxnSpPr>
         <p:spPr>
           <a:xfrm>
-            <a:off x="1270172" y="4256428"/>
+            <a:off x="1270172" y="3102833"/>
             <a:ext cx="360040" cy="0"/>
           </a:xfrm>
           <a:prstGeom prst="line">
@@ -3159,13 +3159,13 @@
       </p:cxnSp>
       <p:cxnSp>
         <p:nvCxnSpPr>
-          <p:cNvPr id="254" name="Connecteur droit 253"/>
+          <p:cNvPr id="214" name="Connecteur droit 213"/>
           <p:cNvCxnSpPr/>
           <p:nvPr/>
         </p:nvCxnSpPr>
         <p:spPr>
           <a:xfrm>
-            <a:off x="1642813" y="4256428"/>
+            <a:off x="1642813" y="3102833"/>
             <a:ext cx="792088" cy="0"/>
           </a:xfrm>
           <a:prstGeom prst="line">
@@ -3192,13 +3192,13 @@
       </p:cxnSp>
       <p:cxnSp>
         <p:nvCxnSpPr>
-          <p:cNvPr id="255" name="Connecteur droit 254"/>
+          <p:cNvPr id="215" name="Connecteur droit 214"/>
           <p:cNvCxnSpPr/>
           <p:nvPr/>
         </p:nvCxnSpPr>
         <p:spPr>
           <a:xfrm>
-            <a:off x="2425862" y="4256092"/>
+            <a:off x="2425862" y="3102497"/>
             <a:ext cx="360040" cy="0"/>
           </a:xfrm>
           <a:prstGeom prst="line">
@@ -3223,13 +3223,13 @@
       </p:cxnSp>
       <p:cxnSp>
         <p:nvCxnSpPr>
-          <p:cNvPr id="256" name="Connecteur droit 255"/>
+          <p:cNvPr id="216" name="Connecteur droit 215"/>
           <p:cNvCxnSpPr/>
           <p:nvPr/>
         </p:nvCxnSpPr>
         <p:spPr>
           <a:xfrm>
-            <a:off x="3502420" y="4256092"/>
+            <a:off x="3502420" y="3102497"/>
             <a:ext cx="360040" cy="0"/>
           </a:xfrm>
           <a:prstGeom prst="line">
@@ -3254,13 +3254,13 @@
       </p:cxnSp>
       <p:cxnSp>
         <p:nvCxnSpPr>
-          <p:cNvPr id="257" name="Connecteur droit 256"/>
+          <p:cNvPr id="217" name="Connecteur droit 216"/>
           <p:cNvCxnSpPr/>
           <p:nvPr/>
         </p:nvCxnSpPr>
         <p:spPr>
           <a:xfrm>
-            <a:off x="3502420" y="4557408"/>
+            <a:off x="3502420" y="3403813"/>
             <a:ext cx="360040" cy="0"/>
           </a:xfrm>
           <a:prstGeom prst="line">
@@ -3285,13 +3285,13 @@
       </p:cxnSp>
       <p:cxnSp>
         <p:nvCxnSpPr>
-          <p:cNvPr id="258" name="Connecteur droit 257"/>
+          <p:cNvPr id="218" name="Connecteur droit 217"/>
           <p:cNvCxnSpPr/>
           <p:nvPr/>
         </p:nvCxnSpPr>
         <p:spPr>
           <a:xfrm>
-            <a:off x="3502420" y="4680892"/>
+            <a:off x="3502420" y="3527297"/>
             <a:ext cx="360040" cy="0"/>
           </a:xfrm>
           <a:prstGeom prst="line">
@@ -3316,13 +3316,13 @@
       </p:cxnSp>
       <p:cxnSp>
         <p:nvCxnSpPr>
-          <p:cNvPr id="259" name="Connecteur droit 258"/>
+          <p:cNvPr id="219" name="Connecteur droit 218"/>
           <p:cNvCxnSpPr/>
           <p:nvPr/>
         </p:nvCxnSpPr>
         <p:spPr>
           <a:xfrm>
-            <a:off x="2782340" y="4256428"/>
+            <a:off x="2782340" y="3102833"/>
             <a:ext cx="720080" cy="0"/>
           </a:xfrm>
           <a:prstGeom prst="line">
@@ -3349,13 +3349,13 @@
       </p:cxnSp>
       <p:cxnSp>
         <p:nvCxnSpPr>
-          <p:cNvPr id="260" name="Connecteur droit 259"/>
+          <p:cNvPr id="220" name="Connecteur droit 219"/>
           <p:cNvCxnSpPr/>
           <p:nvPr/>
         </p:nvCxnSpPr>
         <p:spPr>
           <a:xfrm>
-            <a:off x="2782340" y="4256428"/>
+            <a:off x="2782340" y="3102833"/>
             <a:ext cx="720080" cy="300980"/>
           </a:xfrm>
           <a:prstGeom prst="line">
@@ -3382,13 +3382,13 @@
       </p:cxnSp>
       <p:cxnSp>
         <p:nvCxnSpPr>
-          <p:cNvPr id="261" name="Connecteur droit 260"/>
+          <p:cNvPr id="221" name="Connecteur droit 220"/>
           <p:cNvCxnSpPr/>
           <p:nvPr/>
         </p:nvCxnSpPr>
         <p:spPr>
           <a:xfrm>
-            <a:off x="2782340" y="4256428"/>
+            <a:off x="2782340" y="3102833"/>
             <a:ext cx="727920" cy="424464"/>
           </a:xfrm>
           <a:prstGeom prst="line">
@@ -3415,7 +3415,7 @@
       </p:cxnSp>
       <p:sp>
         <p:nvSpPr>
-          <p:cNvPr id="262" name="ZoneTexte 261"/>
+          <p:cNvPr id="222" name="ZoneTexte 221"/>
           <p:cNvSpPr txBox="1"/>
           <p:nvPr/>
         </p:nvSpPr>
@@ -3451,7 +3451,7 @@
       </p:sp>
       <p:sp>
         <p:nvSpPr>
-          <p:cNvPr id="263" name="ZoneTexte 262"/>
+          <p:cNvPr id="223" name="ZoneTexte 222"/>
           <p:cNvSpPr txBox="1"/>
           <p:nvPr/>
         </p:nvSpPr>
@@ -3530,7 +3530,7 @@
       </p:sp>
       <p:sp>
         <p:nvSpPr>
-          <p:cNvPr id="264" name="ZoneTexte 263"/>
+          <p:cNvPr id="224" name="ZoneTexte 223"/>
           <p:cNvSpPr txBox="1"/>
           <p:nvPr/>
         </p:nvSpPr>
@@ -3612,7 +3612,7 @@
       </p:sp>
       <p:sp>
         <p:nvSpPr>
-          <p:cNvPr id="265" name="ZoneTexte 264"/>
+          <p:cNvPr id="225" name="ZoneTexte 224"/>
           <p:cNvSpPr txBox="1"/>
           <p:nvPr/>
         </p:nvSpPr>
@@ -3656,13 +3656,13 @@
       </p:sp>
       <p:sp>
         <p:nvSpPr>
-          <p:cNvPr id="266" name="Rectangle 265"/>
+          <p:cNvPr id="226" name="Rectangle 225"/>
           <p:cNvSpPr/>
           <p:nvPr/>
         </p:nvSpPr>
         <p:spPr>
           <a:xfrm>
-            <a:off x="213883" y="3948651"/>
+            <a:off x="213883" y="2795056"/>
             <a:ext cx="343364" cy="307777"/>
           </a:xfrm>
           <a:prstGeom prst="rect">
@@ -3695,13 +3695,13 @@
       </p:sp>
       <p:sp>
         <p:nvSpPr>
-          <p:cNvPr id="267" name="Rectangle 266"/>
+          <p:cNvPr id="227" name="Rectangle 226"/>
           <p:cNvSpPr/>
           <p:nvPr/>
         </p:nvSpPr>
         <p:spPr>
           <a:xfrm>
-            <a:off x="1273734" y="3937951"/>
+            <a:off x="1273734" y="2784356"/>
             <a:ext cx="433132" cy="307777"/>
           </a:xfrm>
           <a:prstGeom prst="rect">
@@ -3741,13 +3741,13 @@
       </p:sp>
       <p:cxnSp>
         <p:nvCxnSpPr>
-          <p:cNvPr id="268" name="Connecteur droit 267"/>
+          <p:cNvPr id="228" name="Connecteur droit 227"/>
           <p:cNvCxnSpPr/>
           <p:nvPr/>
         </p:nvCxnSpPr>
         <p:spPr>
           <a:xfrm>
-            <a:off x="478084" y="4256428"/>
+            <a:off x="478084" y="3102833"/>
             <a:ext cx="792088" cy="0"/>
           </a:xfrm>
           <a:prstGeom prst="line">
@@ -3774,13 +3774,13 @@
       </p:cxnSp>
       <p:cxnSp>
         <p:nvCxnSpPr>
-          <p:cNvPr id="269" name="Connecteur droit 268"/>
+          <p:cNvPr id="229" name="Connecteur droit 228"/>
           <p:cNvCxnSpPr/>
           <p:nvPr/>
         </p:nvCxnSpPr>
         <p:spPr>
           <a:xfrm>
-            <a:off x="197892" y="2051561"/>
+            <a:off x="197892" y="897966"/>
             <a:ext cx="336209" cy="0"/>
           </a:xfrm>
           <a:prstGeom prst="line">
@@ -3805,13 +3805,13 @@
       </p:cxnSp>
       <p:sp>
         <p:nvSpPr>
-          <p:cNvPr id="270" name="Rectangle 269"/>
+          <p:cNvPr id="230" name="Rectangle 229"/>
           <p:cNvSpPr/>
           <p:nvPr/>
         </p:nvSpPr>
         <p:spPr>
           <a:xfrm>
-            <a:off x="179086" y="1748139"/>
+            <a:off x="179086" y="594544"/>
             <a:ext cx="373820" cy="307777"/>
           </a:xfrm>
           <a:prstGeom prst="rect">
@@ -3844,13 +3844,13 @@
       </p:sp>
       <p:cxnSp>
         <p:nvCxnSpPr>
-          <p:cNvPr id="271" name="Connecteur droit 270"/>
+          <p:cNvPr id="231" name="Connecteur droit 230"/>
           <p:cNvCxnSpPr/>
           <p:nvPr/>
         </p:nvCxnSpPr>
         <p:spPr>
           <a:xfrm>
-            <a:off x="1270172" y="2517292"/>
+            <a:off x="1270172" y="1363697"/>
             <a:ext cx="360040" cy="0"/>
           </a:xfrm>
           <a:prstGeom prst="line">
@@ -3875,13 +3875,13 @@
       </p:cxnSp>
       <p:cxnSp>
         <p:nvCxnSpPr>
-          <p:cNvPr id="272" name="Connecteur droit 271"/>
+          <p:cNvPr id="232" name="Connecteur droit 231"/>
           <p:cNvCxnSpPr/>
           <p:nvPr/>
         </p:nvCxnSpPr>
         <p:spPr>
           <a:xfrm>
-            <a:off x="550092" y="2051560"/>
+            <a:off x="550092" y="897965"/>
             <a:ext cx="741208" cy="476676"/>
           </a:xfrm>
           <a:prstGeom prst="line">
@@ -3908,13 +3908,13 @@
       </p:cxnSp>
       <p:sp>
         <p:nvSpPr>
-          <p:cNvPr id="273" name="Rectangle 272"/>
+          <p:cNvPr id="233" name="Rectangle 232"/>
           <p:cNvSpPr/>
           <p:nvPr/>
         </p:nvSpPr>
         <p:spPr>
           <a:xfrm>
-            <a:off x="1637367" y="2364475"/>
+            <a:off x="1637367" y="1210880"/>
             <a:ext cx="412292" cy="307777"/>
           </a:xfrm>
           <a:prstGeom prst="rect">
@@ -3954,13 +3954,13 @@
       </p:sp>
       <p:cxnSp>
         <p:nvCxnSpPr>
-          <p:cNvPr id="274" name="Connecteur droit avec flèche 273"/>
+          <p:cNvPr id="234" name="Connecteur droit avec flèche 233"/>
           <p:cNvCxnSpPr/>
           <p:nvPr/>
         </p:nvCxnSpPr>
         <p:spPr>
           <a:xfrm>
-            <a:off x="1441062" y="2672252"/>
+            <a:off x="1441062" y="1518657"/>
             <a:ext cx="0" cy="1201015"/>
           </a:xfrm>
           <a:prstGeom prst="straightConnector1">
@@ -3988,7 +3988,7 @@
       </p:cxnSp>
       <p:sp>
         <p:nvSpPr>
-          <p:cNvPr id="275" name="TextBox 7"/>
+          <p:cNvPr id="235" name="TextBox 7"/>
           <p:cNvSpPr txBox="1">
             <a:spLocks noChangeArrowheads="1"/>
           </p:cNvSpPr>
@@ -3996,7 +3996,7 @@
         </p:nvSpPr>
         <p:spPr bwMode="auto">
           <a:xfrm>
-            <a:off x="1422285" y="3143202"/>
+            <a:off x="1422285" y="1989607"/>
             <a:ext cx="1002044" cy="307777"/>
           </a:xfrm>
           <a:prstGeom prst="rect">
@@ -4146,13 +4146,13 @@
       </p:sp>
       <p:sp>
         <p:nvSpPr>
-          <p:cNvPr id="276" name="ZoneTexte 275"/>
+          <p:cNvPr id="236" name="ZoneTexte 235"/>
           <p:cNvSpPr txBox="1"/>
           <p:nvPr/>
         </p:nvSpPr>
         <p:spPr>
           <a:xfrm rot="10800000" flipV="1">
-            <a:off x="2038857" y="2107549"/>
+            <a:off x="2379364" y="684000"/>
             <a:ext cx="482824" cy="307777"/>
           </a:xfrm>
           <a:prstGeom prst="rect">
@@ -4182,13 +4182,13 @@
       </p:sp>
       <p:cxnSp>
         <p:nvCxnSpPr>
-          <p:cNvPr id="277" name="Connecteur droit 276"/>
+          <p:cNvPr id="237" name="Connecteur droit 236"/>
           <p:cNvCxnSpPr/>
           <p:nvPr/>
         </p:nvCxnSpPr>
         <p:spPr>
           <a:xfrm>
-            <a:off x="1261042" y="2240204"/>
+            <a:off x="1261042" y="1086609"/>
             <a:ext cx="360040" cy="0"/>
           </a:xfrm>
           <a:prstGeom prst="line">
@@ -4213,13 +4213,13 @@
       </p:cxnSp>
       <p:cxnSp>
         <p:nvCxnSpPr>
-          <p:cNvPr id="278" name="Connecteur droit 277"/>
+          <p:cNvPr id="238" name="Connecteur droit 237"/>
           <p:cNvCxnSpPr/>
           <p:nvPr/>
         </p:nvCxnSpPr>
         <p:spPr>
           <a:xfrm>
-            <a:off x="1261042" y="2024180"/>
+            <a:off x="1261042" y="870585"/>
             <a:ext cx="360040" cy="0"/>
           </a:xfrm>
           <a:prstGeom prst="line">
@@ -4244,13 +4244,13 @@
       </p:cxnSp>
       <p:cxnSp>
         <p:nvCxnSpPr>
-          <p:cNvPr id="279" name="Connecteur droit 278"/>
+          <p:cNvPr id="239" name="Connecteur droit 238"/>
           <p:cNvCxnSpPr/>
           <p:nvPr/>
         </p:nvCxnSpPr>
         <p:spPr>
           <a:xfrm>
-            <a:off x="1261042" y="2091178"/>
+            <a:off x="1261042" y="937583"/>
             <a:ext cx="360040" cy="0"/>
           </a:xfrm>
           <a:prstGeom prst="line">
@@ -4275,13 +4275,13 @@
       </p:cxnSp>
       <p:sp>
         <p:nvSpPr>
-          <p:cNvPr id="280" name="Rectangle 279"/>
+          <p:cNvPr id="240" name="Rectangle 239"/>
           <p:cNvSpPr/>
           <p:nvPr/>
         </p:nvSpPr>
         <p:spPr>
           <a:xfrm>
-            <a:off x="1649804" y="2127334"/>
+            <a:off x="1649804" y="973739"/>
             <a:ext cx="412292" cy="307777"/>
           </a:xfrm>
           <a:prstGeom prst="rect">
@@ -4321,13 +4321,13 @@
       </p:sp>
       <p:sp>
         <p:nvSpPr>
-          <p:cNvPr id="281" name="Rectangle 280"/>
+          <p:cNvPr id="241" name="Rectangle 240"/>
           <p:cNvSpPr/>
           <p:nvPr/>
         </p:nvSpPr>
         <p:spPr>
           <a:xfrm>
-            <a:off x="1630212" y="1857605"/>
+            <a:off x="1630212" y="704010"/>
             <a:ext cx="662361" cy="307777"/>
           </a:xfrm>
           <a:prstGeom prst="rect">
@@ -4388,13 +4388,13 @@
       </p:sp>
       <p:cxnSp>
         <p:nvCxnSpPr>
-          <p:cNvPr id="282" name="Connecteur droit 281"/>
+          <p:cNvPr id="242" name="Connecteur droit 241"/>
           <p:cNvCxnSpPr/>
           <p:nvPr/>
         </p:nvCxnSpPr>
         <p:spPr>
           <a:xfrm>
-            <a:off x="540962" y="2051560"/>
+            <a:off x="540962" y="897965"/>
             <a:ext cx="732772" cy="188644"/>
           </a:xfrm>
           <a:prstGeom prst="line">
@@ -4421,13 +4421,13 @@
       </p:cxnSp>
       <p:cxnSp>
         <p:nvCxnSpPr>
-          <p:cNvPr id="283" name="Connecteur droit 282"/>
+          <p:cNvPr id="243" name="Connecteur droit 242"/>
           <p:cNvCxnSpPr/>
           <p:nvPr/>
         </p:nvCxnSpPr>
         <p:spPr>
           <a:xfrm>
-            <a:off x="528964" y="2048211"/>
+            <a:off x="528964" y="894616"/>
             <a:ext cx="741208" cy="42967"/>
           </a:xfrm>
           <a:prstGeom prst="line">
@@ -4454,13 +4454,13 @@
       </p:cxnSp>
       <p:cxnSp>
         <p:nvCxnSpPr>
-          <p:cNvPr id="284" name="Connecteur droit 283"/>
+          <p:cNvPr id="244" name="Connecteur droit 243"/>
           <p:cNvCxnSpPr/>
           <p:nvPr/>
         </p:nvCxnSpPr>
         <p:spPr>
           <a:xfrm flipV="1">
-            <a:off x="540962" y="2024180"/>
+            <a:off x="540962" y="870585"/>
             <a:ext cx="750338" cy="24031"/>
           </a:xfrm>
           <a:prstGeom prst="line">
@@ -4487,14 +4487,14 @@
       </p:cxnSp>
       <p:sp>
         <p:nvSpPr>
-          <p:cNvPr id="285" name="ZoneTexte 284"/>
+          <p:cNvPr id="245" name="ZoneTexte 244"/>
           <p:cNvSpPr txBox="1"/>
           <p:nvPr/>
         </p:nvSpPr>
         <p:spPr>
-          <a:xfrm>
-            <a:off x="1203246" y="547387"/>
-            <a:ext cx="650830" cy="402955"/>
+          <a:xfrm rot="10800000" flipV="1">
+            <a:off x="2379364" y="954584"/>
+            <a:ext cx="482824" cy="307777"/>
           </a:xfrm>
           <a:prstGeom prst="rect">
             <a:avLst/>
@@ -4523,14 +4523,14 @@
       </p:sp>
       <p:sp>
         <p:nvSpPr>
-          <p:cNvPr id="286" name="ZoneTexte 285"/>
+          <p:cNvPr id="246" name="ZoneTexte 245"/>
           <p:cNvSpPr txBox="1"/>
           <p:nvPr/>
         </p:nvSpPr>
         <p:spPr>
-          <a:xfrm>
-            <a:off x="1203246" y="964888"/>
-            <a:ext cx="650830" cy="402955"/>
+          <a:xfrm rot="10800000" flipV="1">
+            <a:off x="2379364" y="1222870"/>
+            <a:ext cx="482824" cy="307777"/>
           </a:xfrm>
           <a:prstGeom prst="rect">
             <a:avLst/>
@@ -4557,297 +4557,428 @@
           </a:p>
         </p:txBody>
       </p:sp>
-      <p:sp>
-        <p:nvSpPr>
-          <p:cNvPr id="287" name="ZoneTexte 286"/>
-          <p:cNvSpPr txBox="1"/>
+      <p:cxnSp>
+        <p:nvCxnSpPr>
+          <p:cNvPr id="247" name="Connecteur droit avec flèche 246"/>
+          <p:cNvCxnSpPr/>
           <p:nvPr/>
-        </p:nvSpPr>
-        <p:spPr>
-          <a:xfrm>
-            <a:off x="1214323" y="1396936"/>
-            <a:ext cx="650830" cy="402955"/>
+        </p:nvCxnSpPr>
+        <p:spPr>
+          <a:xfrm>
+            <a:off x="3942308" y="3403813"/>
+            <a:ext cx="0" cy="143059"/>
+          </a:xfrm>
+          <a:prstGeom prst="straightConnector1">
+            <a:avLst/>
+          </a:prstGeom>
+          <a:ln>
+            <a:solidFill>
+              <a:schemeClr val="tx1"/>
+            </a:solidFill>
+            <a:headEnd type="arrow" w="med" len="sm"/>
+            <a:tailEnd type="arrow" w="med" len="sm"/>
+          </a:ln>
+        </p:spPr>
+        <p:style>
+          <a:lnRef idx="1">
+            <a:schemeClr val="accent1"/>
+          </a:lnRef>
+          <a:fillRef idx="0">
+            <a:schemeClr val="accent1"/>
+          </a:fillRef>
+          <a:effectRef idx="0">
+            <a:schemeClr val="accent1"/>
+          </a:effectRef>
+          <a:fontRef idx="minor">
+            <a:schemeClr val="tx1"/>
+          </a:fontRef>
+        </p:style>
+      </p:cxnSp>
+      <p:cxnSp>
+        <p:nvCxnSpPr>
+          <p:cNvPr id="248" name="Connecteur droit avec flèche 247"/>
+          <p:cNvCxnSpPr/>
+          <p:nvPr/>
+        </p:nvCxnSpPr>
+        <p:spPr>
+          <a:xfrm>
+            <a:off x="3942308" y="3092133"/>
+            <a:ext cx="0" cy="310723"/>
+          </a:xfrm>
+          <a:prstGeom prst="straightConnector1">
+            <a:avLst/>
+          </a:prstGeom>
+          <a:ln>
+            <a:solidFill>
+              <a:schemeClr val="tx1"/>
+            </a:solidFill>
+            <a:headEnd type="arrow" w="med" len="sm"/>
+            <a:tailEnd type="arrow" w="med" len="sm"/>
+          </a:ln>
+        </p:spPr>
+        <p:style>
+          <a:lnRef idx="1">
+            <a:schemeClr val="accent1"/>
+          </a:lnRef>
+          <a:fillRef idx="0">
+            <a:schemeClr val="accent1"/>
+          </a:fillRef>
+          <a:effectRef idx="0">
+            <a:schemeClr val="accent1"/>
+          </a:effectRef>
+          <a:fontRef idx="minor">
+            <a:schemeClr val="tx1"/>
+          </a:fontRef>
+        </p:style>
+      </p:cxnSp>
+      <p:sp>
+        <p:nvSpPr>
+          <p:cNvPr id="249" name="TextBox 7"/>
+          <p:cNvSpPr txBox="1">
+            <a:spLocks noChangeArrowheads="1"/>
+          </p:cNvSpPr>
+          <p:nvPr/>
+        </p:nvSpPr>
+        <p:spPr bwMode="auto">
+          <a:xfrm>
+            <a:off x="3948376" y="3324199"/>
+            <a:ext cx="497988" cy="338554"/>
           </a:xfrm>
           <a:prstGeom prst="rect">
             <a:avLst/>
           </a:prstGeom>
           <a:noFill/>
-        </p:spPr>
-        <p:txBody>
-          <a:bodyPr wrap="none" rtlCol="0">
+          <a:ln>
+            <a:noFill/>
+          </a:ln>
+          <a:extLst>
+            <a:ext uri="{909E8E84-426E-40DD-AFC4-6F175D3DCCD1}">
+              <a14:hiddenFill xmlns:a14="http://schemas.microsoft.com/office/drawing/2010/main">
+                <a:solidFill>
+                  <a:srgbClr val="FFFFFF"/>
+                </a:solidFill>
+              </a14:hiddenFill>
+            </a:ext>
+            <a:ext uri="{91240B29-F687-4F45-9708-019B960494DF}">
+              <a14:hiddenLine xmlns:a14="http://schemas.microsoft.com/office/drawing/2010/main" w="9525">
+                <a:solidFill>
+                  <a:srgbClr val="000000"/>
+                </a:solidFill>
+                <a:miter lim="800000"/>
+                <a:headEnd/>
+                <a:tailEnd/>
+              </a14:hiddenLine>
+            </a:ext>
+          </a:extLst>
+        </p:spPr>
+        <p:txBody>
+          <a:bodyPr wrap="square">
             <a:spAutoFit/>
           </a:bodyPr>
-          <a:lstStyle/>
-          <a:p>
-            <a:r>
-              <a:rPr lang="fr-FR" sz="1400" dirty="0" smtClean="0">
-                <a:latin typeface="Times New Roman" panose="02020603050405020304" pitchFamily="18" charset="0"/>
-                <a:cs typeface="Times New Roman" panose="02020603050405020304" pitchFamily="18" charset="0"/>
+          <a:lstStyle>
+            <a:lvl1pPr>
+              <a:defRPr>
+                <a:solidFill>
+                  <a:schemeClr val="tx1"/>
+                </a:solidFill>
+                <a:latin typeface="Arial" charset="0"/>
+              </a:defRPr>
+            </a:lvl1pPr>
+            <a:lvl2pPr marL="742950" indent="-285750">
+              <a:defRPr>
+                <a:solidFill>
+                  <a:schemeClr val="tx1"/>
+                </a:solidFill>
+                <a:latin typeface="Arial" charset="0"/>
+              </a:defRPr>
+            </a:lvl2pPr>
+            <a:lvl3pPr marL="1143000" indent="-228600">
+              <a:defRPr>
+                <a:solidFill>
+                  <a:schemeClr val="tx1"/>
+                </a:solidFill>
+                <a:latin typeface="Arial" charset="0"/>
+              </a:defRPr>
+            </a:lvl3pPr>
+            <a:lvl4pPr marL="1600200" indent="-228600">
+              <a:defRPr>
+                <a:solidFill>
+                  <a:schemeClr val="tx1"/>
+                </a:solidFill>
+                <a:latin typeface="Arial" charset="0"/>
+              </a:defRPr>
+            </a:lvl4pPr>
+            <a:lvl5pPr marL="2057400" indent="-228600">
+              <a:defRPr>
+                <a:solidFill>
+                  <a:schemeClr val="tx1"/>
+                </a:solidFill>
+                <a:latin typeface="Arial" charset="0"/>
+              </a:defRPr>
+            </a:lvl5pPr>
+            <a:lvl6pPr marL="2514600" indent="-228600" fontAlgn="base">
+              <a:spcBef>
+                <a:spcPct val="0"/>
+              </a:spcBef>
+              <a:spcAft>
+                <a:spcPct val="0"/>
+              </a:spcAft>
+              <a:defRPr>
+                <a:solidFill>
+                  <a:schemeClr val="tx1"/>
+                </a:solidFill>
+                <a:latin typeface="Arial" charset="0"/>
+              </a:defRPr>
+            </a:lvl6pPr>
+            <a:lvl7pPr marL="2971800" indent="-228600" fontAlgn="base">
+              <a:spcBef>
+                <a:spcPct val="0"/>
+              </a:spcBef>
+              <a:spcAft>
+                <a:spcPct val="0"/>
+              </a:spcAft>
+              <a:defRPr>
+                <a:solidFill>
+                  <a:schemeClr val="tx1"/>
+                </a:solidFill>
+                <a:latin typeface="Arial" charset="0"/>
+              </a:defRPr>
+            </a:lvl7pPr>
+            <a:lvl8pPr marL="3429000" indent="-228600" fontAlgn="base">
+              <a:spcBef>
+                <a:spcPct val="0"/>
+              </a:spcBef>
+              <a:spcAft>
+                <a:spcPct val="0"/>
+              </a:spcAft>
+              <a:defRPr>
+                <a:solidFill>
+                  <a:schemeClr val="tx1"/>
+                </a:solidFill>
+                <a:latin typeface="Arial" charset="0"/>
+              </a:defRPr>
+            </a:lvl8pPr>
+            <a:lvl9pPr marL="3886200" indent="-228600" fontAlgn="base">
+              <a:spcBef>
+                <a:spcPct val="0"/>
+              </a:spcBef>
+              <a:spcAft>
+                <a:spcPct val="0"/>
+              </a:spcAft>
+              <a:defRPr>
+                <a:solidFill>
+                  <a:schemeClr val="tx1"/>
+                </a:solidFill>
+                <a:latin typeface="Arial" charset="0"/>
+              </a:defRPr>
+            </a:lvl9pPr>
+          </a:lstStyle>
+          <a:p>
+            <a:r>
+              <a:rPr lang="en-US" altLang="zh-CN" sz="1400" dirty="0" smtClean="0">
+                <a:latin typeface="Times New Roman" pitchFamily="18" charset="0"/>
+                <a:ea typeface="宋体" pitchFamily="2" charset="-122"/>
+                <a:sym typeface="Symbol" pitchFamily="18" charset="2"/>
               </a:rPr>
-              <a:t>(…)</a:t>
-            </a:r>
-            <a:endParaRPr lang="en-US" sz="1400" dirty="0">
-              <a:latin typeface="Times New Roman" panose="02020603050405020304" pitchFamily="18" charset="0"/>
-              <a:cs typeface="Times New Roman" panose="02020603050405020304" pitchFamily="18" charset="0"/>
+              <a:t>2</a:t>
+            </a:r>
+            <a:r>
+              <a:rPr lang="en-US" altLang="zh-CN" sz="1600" dirty="0" smtClean="0">
+                <a:latin typeface="Monotype Corsiva" panose="03010101010201010101" pitchFamily="66" charset="0"/>
+                <a:ea typeface="宋体" pitchFamily="2" charset="-122"/>
+                <a:sym typeface="Symbol" pitchFamily="18" charset="2"/>
+              </a:rPr>
+              <a:t>D</a:t>
+            </a:r>
+            <a:r>
+              <a:rPr lang="en-US" altLang="zh-CN" sz="1400" baseline="-25000" dirty="0" smtClean="0">
+                <a:latin typeface="Times New Roman" pitchFamily="18" charset="0"/>
+                <a:ea typeface="宋体" pitchFamily="2" charset="-122"/>
+                <a:sym typeface="Symbol" pitchFamily="18" charset="2"/>
+              </a:rPr>
+              <a:t>0</a:t>
+            </a:r>
+            <a:endParaRPr lang="en-US" altLang="zh-CN" sz="1400" baseline="-25000" dirty="0">
+              <a:latin typeface="Times New Roman" pitchFamily="18" charset="0"/>
+              <a:ea typeface="宋体" pitchFamily="2" charset="-122"/>
             </a:endParaRPr>
           </a:p>
         </p:txBody>
       </p:sp>
-      <p:grpSp>
-        <p:nvGrpSpPr>
-          <p:cNvPr id="288" name="Groupe 287"/>
-          <p:cNvGrpSpPr/>
+      <p:sp>
+        <p:nvSpPr>
+          <p:cNvPr id="250" name="TextBox 7"/>
+          <p:cNvSpPr txBox="1">
+            <a:spLocks noChangeArrowheads="1"/>
+          </p:cNvSpPr>
           <p:nvPr/>
-        </p:nvGrpSpPr>
-        <p:grpSpPr>
-          <a:xfrm>
-            <a:off x="184112" y="1294562"/>
-            <a:ext cx="355015" cy="307777"/>
-            <a:chOff x="184112" y="1258738"/>
-            <a:chExt cx="355015" cy="307777"/>
-          </a:xfrm>
-        </p:grpSpPr>
-        <p:cxnSp>
-          <p:nvCxnSpPr>
-            <p:cNvPr id="289" name="Connecteur droit 288"/>
-            <p:cNvCxnSpPr/>
-            <p:nvPr/>
-          </p:nvCxnSpPr>
-          <p:spPr>
-            <a:xfrm>
-              <a:off x="202918" y="1562160"/>
-              <a:ext cx="336209" cy="0"/>
-            </a:xfrm>
-            <a:prstGeom prst="line">
-              <a:avLst/>
-            </a:prstGeom>
-            <a:ln w="28575"/>
-          </p:spPr>
-          <p:style>
-            <a:lnRef idx="1">
-              <a:schemeClr val="dk1"/>
-            </a:lnRef>
-            <a:fillRef idx="0">
-              <a:schemeClr val="dk1"/>
-            </a:fillRef>
-            <a:effectRef idx="0">
-              <a:schemeClr val="dk1"/>
-            </a:effectRef>
-            <a:fontRef idx="minor">
-              <a:schemeClr val="tx1"/>
-            </a:fontRef>
-          </p:style>
-        </p:cxnSp>
-        <p:sp>
-          <p:nvSpPr>
-            <p:cNvPr id="290" name="Rectangle 289"/>
-            <p:cNvSpPr/>
-            <p:nvPr/>
-          </p:nvSpPr>
-          <p:spPr>
-            <a:xfrm>
-              <a:off x="184112" y="1258738"/>
-              <a:ext cx="343364" cy="307777"/>
-            </a:xfrm>
-            <a:prstGeom prst="rect">
-              <a:avLst/>
-            </a:prstGeom>
-          </p:spPr>
-          <p:txBody>
-            <a:bodyPr wrap="none">
-              <a:spAutoFit/>
-            </a:bodyPr>
-            <a:lstStyle/>
-            <a:p>
-              <a:r>
-                <a:rPr lang="fr-FR" sz="1400" baseline="30000" dirty="0" smtClean="0">
-                  <a:latin typeface="Times New Roman" panose="02020603050405020304" pitchFamily="18" charset="0"/>
-                  <a:cs typeface="Times New Roman" panose="02020603050405020304" pitchFamily="18" charset="0"/>
-                </a:rPr>
-                <a:t>4</a:t>
-              </a:r>
-              <a:r>
-                <a:rPr lang="fr-FR" sz="1400" dirty="0">
-                  <a:latin typeface="Times New Roman" panose="02020603050405020304" pitchFamily="18" charset="0"/>
-                  <a:cs typeface="Times New Roman" panose="02020603050405020304" pitchFamily="18" charset="0"/>
-                </a:rPr>
-                <a:t>P</a:t>
-              </a:r>
-              <a:endParaRPr lang="en-US" sz="1400" dirty="0"/>
-            </a:p>
-          </p:txBody>
-        </p:sp>
-      </p:grpSp>
-      <p:grpSp>
-        <p:nvGrpSpPr>
-          <p:cNvPr id="291" name="Groupe 290"/>
-          <p:cNvGrpSpPr/>
-          <p:nvPr/>
-        </p:nvGrpSpPr>
-        <p:grpSpPr>
-          <a:xfrm>
-            <a:off x="185947" y="862562"/>
-            <a:ext cx="373820" cy="307777"/>
-            <a:chOff x="184112" y="1258738"/>
-            <a:chExt cx="373820" cy="307777"/>
-          </a:xfrm>
-        </p:grpSpPr>
-        <p:cxnSp>
-          <p:nvCxnSpPr>
-            <p:cNvPr id="292" name="Connecteur droit 291"/>
-            <p:cNvCxnSpPr/>
-            <p:nvPr/>
-          </p:nvCxnSpPr>
-          <p:spPr>
-            <a:xfrm>
-              <a:off x="202918" y="1562160"/>
-              <a:ext cx="336209" cy="0"/>
-            </a:xfrm>
-            <a:prstGeom prst="line">
-              <a:avLst/>
-            </a:prstGeom>
-            <a:ln w="28575"/>
-          </p:spPr>
-          <p:style>
-            <a:lnRef idx="1">
-              <a:schemeClr val="dk1"/>
-            </a:lnRef>
-            <a:fillRef idx="0">
-              <a:schemeClr val="dk1"/>
-            </a:fillRef>
-            <a:effectRef idx="0">
-              <a:schemeClr val="dk1"/>
-            </a:effectRef>
-            <a:fontRef idx="minor">
-              <a:schemeClr val="tx1"/>
-            </a:fontRef>
-          </p:style>
-        </p:cxnSp>
-        <p:sp>
-          <p:nvSpPr>
-            <p:cNvPr id="293" name="Rectangle 292"/>
-            <p:cNvSpPr/>
-            <p:nvPr/>
-          </p:nvSpPr>
-          <p:spPr>
-            <a:xfrm>
-              <a:off x="184112" y="1258738"/>
-              <a:ext cx="373820" cy="307777"/>
-            </a:xfrm>
-            <a:prstGeom prst="rect">
-              <a:avLst/>
-            </a:prstGeom>
-          </p:spPr>
-          <p:txBody>
-            <a:bodyPr wrap="none">
-              <a:spAutoFit/>
-            </a:bodyPr>
-            <a:lstStyle/>
-            <a:p>
-              <a:r>
-                <a:rPr lang="fr-FR" sz="1400" baseline="30000" dirty="0" smtClean="0">
-                  <a:latin typeface="Times New Roman" panose="02020603050405020304" pitchFamily="18" charset="0"/>
-                  <a:cs typeface="Times New Roman" panose="02020603050405020304" pitchFamily="18" charset="0"/>
-                </a:rPr>
-                <a:t>4</a:t>
-              </a:r>
-              <a:r>
-                <a:rPr lang="fr-FR" sz="1400" dirty="0">
-                  <a:latin typeface="Times New Roman" panose="02020603050405020304" pitchFamily="18" charset="0"/>
-                  <a:cs typeface="Times New Roman" panose="02020603050405020304" pitchFamily="18" charset="0"/>
-                </a:rPr>
-                <a:t>D</a:t>
-              </a:r>
-              <a:endParaRPr lang="en-US" sz="1400" dirty="0"/>
-            </a:p>
-          </p:txBody>
-        </p:sp>
-      </p:grpSp>
-      <p:grpSp>
-        <p:nvGrpSpPr>
-          <p:cNvPr id="294" name="Groupe 293"/>
-          <p:cNvGrpSpPr/>
-          <p:nvPr/>
-        </p:nvGrpSpPr>
-        <p:grpSpPr>
-          <a:xfrm>
-            <a:off x="184112" y="430562"/>
-            <a:ext cx="355015" cy="307777"/>
-            <a:chOff x="184112" y="1258738"/>
-            <a:chExt cx="355015" cy="307777"/>
-          </a:xfrm>
-        </p:grpSpPr>
-        <p:cxnSp>
-          <p:nvCxnSpPr>
-            <p:cNvPr id="295" name="Connecteur droit 294"/>
-            <p:cNvCxnSpPr/>
-            <p:nvPr/>
-          </p:nvCxnSpPr>
-          <p:spPr>
-            <a:xfrm>
-              <a:off x="202918" y="1562160"/>
-              <a:ext cx="336209" cy="0"/>
-            </a:xfrm>
-            <a:prstGeom prst="line">
-              <a:avLst/>
-            </a:prstGeom>
-            <a:ln w="28575"/>
-          </p:spPr>
-          <p:style>
-            <a:lnRef idx="1">
-              <a:schemeClr val="dk1"/>
-            </a:lnRef>
-            <a:fillRef idx="0">
-              <a:schemeClr val="dk1"/>
-            </a:fillRef>
-            <a:effectRef idx="0">
-              <a:schemeClr val="dk1"/>
-            </a:effectRef>
-            <a:fontRef idx="minor">
-              <a:schemeClr val="tx1"/>
-            </a:fontRef>
-          </p:style>
-        </p:cxnSp>
-        <p:sp>
-          <p:nvSpPr>
-            <p:cNvPr id="296" name="Rectangle 295"/>
-            <p:cNvSpPr/>
-            <p:nvPr/>
-          </p:nvSpPr>
-          <p:spPr>
-            <a:xfrm>
-              <a:off x="184112" y="1258738"/>
-              <a:ext cx="343364" cy="307777"/>
-            </a:xfrm>
-            <a:prstGeom prst="rect">
-              <a:avLst/>
-            </a:prstGeom>
-          </p:spPr>
-          <p:txBody>
-            <a:bodyPr wrap="none">
-              <a:spAutoFit/>
-            </a:bodyPr>
-            <a:lstStyle/>
-            <a:p>
-              <a:r>
-                <a:rPr lang="fr-FR" sz="1400" baseline="30000" dirty="0" smtClean="0">
-                  <a:latin typeface="Times New Roman" panose="02020603050405020304" pitchFamily="18" charset="0"/>
-                  <a:cs typeface="Times New Roman" panose="02020603050405020304" pitchFamily="18" charset="0"/>
-                </a:rPr>
-                <a:t>4</a:t>
-              </a:r>
-              <a:r>
-                <a:rPr lang="fr-FR" sz="1400" dirty="0">
-                  <a:latin typeface="Times New Roman" panose="02020603050405020304" pitchFamily="18" charset="0"/>
-                  <a:cs typeface="Times New Roman" panose="02020603050405020304" pitchFamily="18" charset="0"/>
-                </a:rPr>
-                <a:t>F</a:t>
-              </a:r>
-              <a:endParaRPr lang="en-US" sz="1400" dirty="0"/>
-            </a:p>
-          </p:txBody>
-        </p:sp>
-      </p:grpSp>
+        </p:nvSpPr>
+        <p:spPr bwMode="auto">
+          <a:xfrm>
+            <a:off x="3948376" y="3096000"/>
+            <a:ext cx="497988" cy="338554"/>
+          </a:xfrm>
+          <a:prstGeom prst="rect">
+            <a:avLst/>
+          </a:prstGeom>
+          <a:noFill/>
+          <a:ln>
+            <a:noFill/>
+          </a:ln>
+          <a:extLst>
+            <a:ext uri="{909E8E84-426E-40DD-AFC4-6F175D3DCCD1}">
+              <a14:hiddenFill xmlns:a14="http://schemas.microsoft.com/office/drawing/2010/main">
+                <a:solidFill>
+                  <a:srgbClr val="FFFFFF"/>
+                </a:solidFill>
+              </a14:hiddenFill>
+            </a:ext>
+            <a:ext uri="{91240B29-F687-4F45-9708-019B960494DF}">
+              <a14:hiddenLine xmlns:a14="http://schemas.microsoft.com/office/drawing/2010/main" w="9525">
+                <a:solidFill>
+                  <a:srgbClr val="000000"/>
+                </a:solidFill>
+                <a:miter lim="800000"/>
+                <a:headEnd/>
+                <a:tailEnd/>
+              </a14:hiddenLine>
+            </a:ext>
+          </a:extLst>
+        </p:spPr>
+        <p:txBody>
+          <a:bodyPr wrap="square">
+            <a:spAutoFit/>
+          </a:bodyPr>
+          <a:lstStyle>
+            <a:lvl1pPr>
+              <a:defRPr>
+                <a:solidFill>
+                  <a:schemeClr val="tx1"/>
+                </a:solidFill>
+                <a:latin typeface="Arial" charset="0"/>
+              </a:defRPr>
+            </a:lvl1pPr>
+            <a:lvl2pPr marL="742950" indent="-285750">
+              <a:defRPr>
+                <a:solidFill>
+                  <a:schemeClr val="tx1"/>
+                </a:solidFill>
+                <a:latin typeface="Arial" charset="0"/>
+              </a:defRPr>
+            </a:lvl2pPr>
+            <a:lvl3pPr marL="1143000" indent="-228600">
+              <a:defRPr>
+                <a:solidFill>
+                  <a:schemeClr val="tx1"/>
+                </a:solidFill>
+                <a:latin typeface="Arial" charset="0"/>
+              </a:defRPr>
+            </a:lvl3pPr>
+            <a:lvl4pPr marL="1600200" indent="-228600">
+              <a:defRPr>
+                <a:solidFill>
+                  <a:schemeClr val="tx1"/>
+                </a:solidFill>
+                <a:latin typeface="Arial" charset="0"/>
+              </a:defRPr>
+            </a:lvl4pPr>
+            <a:lvl5pPr marL="2057400" indent="-228600">
+              <a:defRPr>
+                <a:solidFill>
+                  <a:schemeClr val="tx1"/>
+                </a:solidFill>
+                <a:latin typeface="Arial" charset="0"/>
+              </a:defRPr>
+            </a:lvl5pPr>
+            <a:lvl6pPr marL="2514600" indent="-228600" fontAlgn="base">
+              <a:spcBef>
+                <a:spcPct val="0"/>
+              </a:spcBef>
+              <a:spcAft>
+                <a:spcPct val="0"/>
+              </a:spcAft>
+              <a:defRPr>
+                <a:solidFill>
+                  <a:schemeClr val="tx1"/>
+                </a:solidFill>
+                <a:latin typeface="Arial" charset="0"/>
+              </a:defRPr>
+            </a:lvl6pPr>
+            <a:lvl7pPr marL="2971800" indent="-228600" fontAlgn="base">
+              <a:spcBef>
+                <a:spcPct val="0"/>
+              </a:spcBef>
+              <a:spcAft>
+                <a:spcPct val="0"/>
+              </a:spcAft>
+              <a:defRPr>
+                <a:solidFill>
+                  <a:schemeClr val="tx1"/>
+                </a:solidFill>
+                <a:latin typeface="Arial" charset="0"/>
+              </a:defRPr>
+            </a:lvl7pPr>
+            <a:lvl8pPr marL="3429000" indent="-228600" fontAlgn="base">
+              <a:spcBef>
+                <a:spcPct val="0"/>
+              </a:spcBef>
+              <a:spcAft>
+                <a:spcPct val="0"/>
+              </a:spcAft>
+              <a:defRPr>
+                <a:solidFill>
+                  <a:schemeClr val="tx1"/>
+                </a:solidFill>
+                <a:latin typeface="Arial" charset="0"/>
+              </a:defRPr>
+            </a:lvl8pPr>
+            <a:lvl9pPr marL="3886200" indent="-228600" fontAlgn="base">
+              <a:spcBef>
+                <a:spcPct val="0"/>
+              </a:spcBef>
+              <a:spcAft>
+                <a:spcPct val="0"/>
+              </a:spcAft>
+              <a:defRPr>
+                <a:solidFill>
+                  <a:schemeClr val="tx1"/>
+                </a:solidFill>
+                <a:latin typeface="Arial" charset="0"/>
+              </a:defRPr>
+            </a:lvl9pPr>
+          </a:lstStyle>
+          <a:p>
+            <a:r>
+              <a:rPr lang="en-US" altLang="zh-CN" sz="1400" dirty="0">
+                <a:latin typeface="Times New Roman" pitchFamily="18" charset="0"/>
+                <a:ea typeface="宋体" pitchFamily="2" charset="-122"/>
+                <a:sym typeface="Symbol" pitchFamily="18" charset="2"/>
+              </a:rPr>
+              <a:t>6</a:t>
+            </a:r>
+            <a:r>
+              <a:rPr lang="en-US" altLang="zh-CN" sz="1600" dirty="0" smtClean="0">
+                <a:latin typeface="Monotype Corsiva" panose="03010101010201010101" pitchFamily="66" charset="0"/>
+                <a:ea typeface="宋体" pitchFamily="2" charset="-122"/>
+                <a:sym typeface="Symbol" pitchFamily="18" charset="2"/>
+              </a:rPr>
+              <a:t>D</a:t>
+            </a:r>
+            <a:r>
+              <a:rPr lang="en-US" altLang="zh-CN" sz="1400" baseline="-25000" dirty="0" smtClean="0">
+                <a:latin typeface="Times New Roman" pitchFamily="18" charset="0"/>
+                <a:ea typeface="宋体" pitchFamily="2" charset="-122"/>
+                <a:sym typeface="Symbol" pitchFamily="18" charset="2"/>
+              </a:rPr>
+              <a:t>0</a:t>
+            </a:r>
+            <a:endParaRPr lang="en-US" altLang="zh-CN" sz="1400" baseline="-25000" dirty="0">
+              <a:latin typeface="Times New Roman" pitchFamily="18" charset="0"/>
+              <a:ea typeface="宋体" pitchFamily="2" charset="-122"/>
+            </a:endParaRPr>
+          </a:p>
+        </p:txBody>
+      </p:sp>
     </p:spTree>
     <p:extLst>
       <p:ext uri="{BB962C8B-B14F-4D97-AF65-F5344CB8AC3E}">

</xml_diff>